<commit_message>
next version of the ppt
</commit_message>
<xml_diff>
--- a/final_presentation/finalPpt1.2.pptx
+++ b/final_presentation/finalPpt1.2.pptx
@@ -35,8 +35,8 @@
     <p:sldId id="432" r:id="rId23"/>
     <p:sldId id="413" r:id="rId24"/>
     <p:sldId id="414" r:id="rId25"/>
-    <p:sldId id="419" r:id="rId26"/>
-    <p:sldId id="421" r:id="rId27"/>
+    <p:sldId id="421" r:id="rId26"/>
+    <p:sldId id="419" r:id="rId27"/>
     <p:sldId id="422" r:id="rId28"/>
     <p:sldId id="423" r:id="rId29"/>
     <p:sldId id="424" r:id="rId30"/>
@@ -320,7 +320,7 @@
               <a:pPr>
                 <a:defRPr/>
               </a:pPr>
-              <a:t>15/11/2018</a:t>
+              <a:t>16/11/2018</a:t>
             </a:fld>
             <a:endParaRPr lang="en-GB" dirty="0"/>
           </a:p>
@@ -539,7 +539,7 @@
               <a:pPr>
                 <a:defRPr/>
               </a:pPr>
-              <a:t>15/11/2018</a:t>
+              <a:t>16/11/2018</a:t>
             </a:fld>
             <a:endParaRPr lang="en-GB"/>
           </a:p>
@@ -16420,58 +16420,6 @@
           </a:graphicData>
         </a:graphic>
       </p:graphicFrame>
-      <p:sp>
-        <p:nvSpPr>
-          <p:cNvPr id="15" name="Footer Placeholder 14"/>
-          <p:cNvSpPr>
-            <a:spLocks noGrp="1"/>
-          </p:cNvSpPr>
-          <p:nvPr>
-            <p:ph type="ftr" sz="quarter" idx="12"/>
-          </p:nvPr>
-        </p:nvSpPr>
-        <p:spPr>
-          <a:xfrm>
-            <a:off x="318008" y="6378854"/>
-            <a:ext cx="8265818" cy="277021"/>
-          </a:xfrm>
-        </p:spPr>
-        <p:txBody>
-          <a:bodyPr/>
-          <a:lstStyle/>
-          <a:p>
-            <a:pPr marL="342900" indent="-342900">
-              <a:buFont typeface="+mj-lt"/>
-              <a:buAutoNum type="arabicPeriod"/>
-            </a:pPr>
-            <a:r>
-              <a:rPr lang="en-US" dirty="0">
-                <a:solidFill>
-                  <a:srgbClr val="000000"/>
-                </a:solidFill>
-              </a:rPr>
-              <a:t>A Fast Forward Error Correction Toolbox (</a:t>
-            </a:r>
-            <a:r>
-              <a:rPr lang="en-US" dirty="0">
-                <a:solidFill>
-                  <a:srgbClr val="000000"/>
-                </a:solidFill>
-                <a:hlinkClick r:id="rId5"/>
-              </a:rPr>
-              <a:t>http://aff3ct.github.io/</a:t>
-            </a:r>
-            <a:r>
-              <a:rPr lang="en-US" dirty="0">
-                <a:solidFill>
-                  <a:srgbClr val="000000"/>
-                </a:solidFill>
-              </a:rPr>
-              <a:t>) (No SIMD optimization)</a:t>
-            </a:r>
-          </a:p>
-        </p:txBody>
-      </p:sp>
       <p:graphicFrame>
         <p:nvGraphicFramePr>
           <p:cNvPr id="26" name="Table 25"/>
@@ -16481,7 +16429,7 @@
           <p:nvPr>
             <p:extLst>
               <p:ext uri="{D42A27DB-BD31-4B8C-83A1-F6EECF244321}">
-                <p14:modId xmlns:p14="http://schemas.microsoft.com/office/powerpoint/2010/main" val="4107866162"/>
+                <p14:modId xmlns:p14="http://schemas.microsoft.com/office/powerpoint/2010/main" val="2260125576"/>
               </p:ext>
             </p:extLst>
           </p:nvPr>
@@ -16544,30 +16492,7 @@
                           <a:ea typeface="+mn-ea"/>
                           <a:cs typeface="+mn-cs"/>
                         </a:rPr>
-                        <a:t>aff3c</a:t>
-                      </a:r>
-                      <a:r>
-                        <a:rPr lang="en-US" sz="1700" b="0" kern="1200" baseline="0" dirty="0">
-                          <a:solidFill>
-                            <a:schemeClr val="tx1"/>
-                          </a:solidFill>
-                          <a:latin typeface="+mn-lt"/>
-                          <a:ea typeface="+mn-ea"/>
-                          <a:cs typeface="+mn-cs"/>
-                        </a:rPr>
-                        <a:t>t</a:t>
-                      </a:r>
-                      <a:r>
-                        <a:rPr lang="en-US" sz="1600" b="0" baseline="30000" dirty="0"/>
-                        <a:t>[1]</a:t>
-                      </a:r>
-                      <a:r>
-                        <a:rPr lang="en-US" sz="1600" b="0" dirty="0"/>
-                        <a:t> (No</a:t>
-                      </a:r>
-                      <a:r>
-                        <a:rPr lang="en-US" sz="1600" b="0" baseline="0" dirty="0"/>
-                        <a:t> SIMD)</a:t>
+                        <a:t>Functional</a:t>
                       </a:r>
                       <a:endParaRPr lang="en-US" sz="1700" b="0" kern="1200" baseline="0" dirty="0">
                         <a:solidFill>
@@ -16718,7 +16643,7 @@
                     <a:p>
                       <a:r>
                         <a:rPr lang="en-US" sz="1600" dirty="0"/>
-                        <a:t>5.6 </a:t>
+                        <a:t>34 </a:t>
                       </a:r>
                       <a:r>
                         <a:rPr lang="el-GR" sz="1600" dirty="0"/>
@@ -17114,8 +17039,8 @@
         </p:blipFill>
         <p:spPr>
           <a:xfrm>
-            <a:off x="413106" y="1995161"/>
-            <a:ext cx="4466962" cy="4252920"/>
+            <a:off x="448617" y="1758141"/>
+            <a:ext cx="5020028" cy="4779485"/>
           </a:xfrm>
           <a:prstGeom prst="rect">
             <a:avLst/>
@@ -17865,1138 +17790,8 @@
           <a:chExt cx="0" cy="0"/>
         </a:xfrm>
       </p:grpSpPr>
-      <p:sp>
-        <p:nvSpPr>
-          <p:cNvPr id="2" name="Content Placeholder 1"/>
-          <p:cNvSpPr>
-            <a:spLocks noGrp="1"/>
-          </p:cNvSpPr>
-          <p:nvPr>
-            <p:ph idx="1"/>
-          </p:nvPr>
-        </p:nvSpPr>
-        <p:spPr>
-          <a:xfrm>
-            <a:off x="318008" y="1445059"/>
-            <a:ext cx="8508999" cy="4699572"/>
-          </a:xfrm>
-        </p:spPr>
-        <p:txBody>
-          <a:bodyPr/>
-          <a:lstStyle/>
-          <a:p>
-            <a:pPr marL="285750" indent="-285750">
-              <a:buFont typeface="Arial" panose="020B0604020202020204" pitchFamily="34" charset="0"/>
-              <a:buChar char="•"/>
-            </a:pPr>
-            <a:r>
-              <a:rPr lang="en-US" dirty="0"/>
-              <a:t>Packing multiple frozen bits allows efficient identification of component codes.</a:t>
-            </a:r>
-          </a:p>
-          <a:p>
-            <a:pPr marL="285750" indent="-285750">
-              <a:buFont typeface="Arial" panose="020B0604020202020204" pitchFamily="34" charset="0"/>
-              <a:buChar char="•"/>
-            </a:pPr>
-            <a:r>
-              <a:rPr lang="en-US" dirty="0"/>
-              <a:t>Frozen pattern is passed in packed bit format to decoder.</a:t>
-            </a:r>
-          </a:p>
-          <a:p>
-            <a:pPr marL="285750" indent="-285750">
-              <a:buFont typeface="Arial" panose="020B0604020202020204" pitchFamily="34" charset="0"/>
-              <a:buChar char="•"/>
-            </a:pPr>
-            <a:r>
-              <a:rPr lang="en-US" dirty="0"/>
-              <a:t>Identification component codes is performed at run time.</a:t>
-            </a:r>
-          </a:p>
-          <a:p>
-            <a:pPr marL="285750" indent="-285750">
-              <a:buFont typeface="Arial" panose="020B0604020202020204" pitchFamily="34" charset="0"/>
-              <a:buChar char="•"/>
-            </a:pPr>
-            <a:r>
-              <a:rPr lang="en-US" dirty="0"/>
-              <a:t>Packing of multiple bits together allows identification of component codes in a single comparison instruction.</a:t>
-            </a:r>
-          </a:p>
-          <a:p>
-            <a:pPr marL="285750" indent="-285750">
-              <a:buFont typeface="Arial" panose="020B0604020202020204" pitchFamily="34" charset="0"/>
-              <a:buChar char="•"/>
-            </a:pPr>
-            <a:r>
-              <a:rPr lang="en-US" dirty="0"/>
-              <a:t>Reduces the expensive branch instructions and exploits data parallelism.</a:t>
-            </a:r>
-          </a:p>
-          <a:p>
-            <a:pPr marL="285750" indent="-285750">
-              <a:buFont typeface="Arial" panose="020B0604020202020204" pitchFamily="34" charset="0"/>
-              <a:buChar char="•"/>
-            </a:pPr>
-            <a:endParaRPr lang="en-US" dirty="0"/>
-          </a:p>
-          <a:p>
-            <a:pPr marL="285750" indent="-285750">
-              <a:buFont typeface="Arial" panose="020B0604020202020204" pitchFamily="34" charset="0"/>
-              <a:buChar char="•"/>
-            </a:pPr>
-            <a:r>
-              <a:rPr lang="en-US" dirty="0"/>
-              <a:t>For frozen pattern at child node  = {1,1……..1,1} //256 values.</a:t>
-            </a:r>
-          </a:p>
-          <a:p>
-            <a:pPr marL="285750" indent="-285750">
-              <a:buFont typeface="Arial" panose="020B0604020202020204" pitchFamily="34" charset="0"/>
-              <a:buChar char="•"/>
-            </a:pPr>
-            <a:endParaRPr lang="en-US" dirty="0"/>
-          </a:p>
-          <a:p>
-            <a:endParaRPr lang="en-US" dirty="0"/>
-          </a:p>
-          <a:p>
-            <a:r>
-              <a:rPr lang="de-DE" sz="900" b="1" dirty="0" err="1">
-                <a:solidFill>
-                  <a:srgbClr val="7F0055"/>
-                </a:solidFill>
-                <a:latin typeface="Consolas" panose="020B0609020204030204" pitchFamily="49" charset="0"/>
-              </a:rPr>
-              <a:t>bool</a:t>
-            </a:r>
-            <a:r>
-              <a:rPr lang="de-DE" sz="900" b="1" dirty="0">
-                <a:solidFill>
-                  <a:srgbClr val="000000"/>
-                </a:solidFill>
-                <a:latin typeface="Consolas" panose="020B0609020204030204" pitchFamily="49" charset="0"/>
-              </a:rPr>
-              <a:t> </a:t>
-            </a:r>
-            <a:r>
-              <a:rPr lang="de-DE" sz="900" b="1" dirty="0" err="1">
-                <a:solidFill>
-                  <a:srgbClr val="000000"/>
-                </a:solidFill>
-                <a:latin typeface="Consolas" panose="020B0609020204030204" pitchFamily="49" charset="0"/>
-              </a:rPr>
-              <a:t>isRateZeroNode</a:t>
-            </a:r>
-            <a:r>
-              <a:rPr lang="de-DE" sz="900" b="1" dirty="0">
-                <a:solidFill>
-                  <a:srgbClr val="000000"/>
-                </a:solidFill>
-                <a:latin typeface="Consolas" panose="020B0609020204030204" pitchFamily="49" charset="0"/>
-              </a:rPr>
-              <a:t>(</a:t>
-            </a:r>
-            <a:r>
-              <a:rPr lang="de-DE" sz="900" b="1" dirty="0">
-                <a:solidFill>
-                  <a:srgbClr val="005032"/>
-                </a:solidFill>
-                <a:latin typeface="Consolas" panose="020B0609020204030204" pitchFamily="49" charset="0"/>
-              </a:rPr>
-              <a:t>int8_t</a:t>
-            </a:r>
-            <a:r>
-              <a:rPr lang="de-DE" sz="900" b="1" dirty="0">
-                <a:solidFill>
-                  <a:srgbClr val="000000"/>
-                </a:solidFill>
-                <a:latin typeface="Consolas" panose="020B0609020204030204" pitchFamily="49" charset="0"/>
-              </a:rPr>
-              <a:t> </a:t>
-            </a:r>
-            <a:r>
-              <a:rPr lang="de-DE" sz="900" b="1" dirty="0" err="1">
-                <a:solidFill>
-                  <a:srgbClr val="000000"/>
-                </a:solidFill>
-                <a:latin typeface="Consolas" panose="020B0609020204030204" pitchFamily="49" charset="0"/>
-              </a:rPr>
-              <a:t>frozenPattern</a:t>
-            </a:r>
-            <a:r>
-              <a:rPr lang="de-DE" sz="900" b="1" dirty="0">
-                <a:solidFill>
-                  <a:srgbClr val="000000"/>
-                </a:solidFill>
-                <a:latin typeface="Consolas" panose="020B0609020204030204" pitchFamily="49" charset="0"/>
-              </a:rPr>
-              <a:t>[])</a:t>
-            </a:r>
-          </a:p>
-          <a:p>
-            <a:r>
-              <a:rPr lang="en-US" sz="900" dirty="0">
-                <a:solidFill>
-                  <a:srgbClr val="000000"/>
-                </a:solidFill>
-                <a:latin typeface="Consolas" panose="020B0609020204030204" pitchFamily="49" charset="0"/>
-              </a:rPr>
-              <a:t>{</a:t>
-            </a:r>
-          </a:p>
-          <a:p>
-            <a:r>
-              <a:rPr lang="en-US" sz="900" dirty="0">
-                <a:solidFill>
-                  <a:srgbClr val="000000"/>
-                </a:solidFill>
-                <a:latin typeface="Consolas" panose="020B0609020204030204" pitchFamily="49" charset="0"/>
-              </a:rPr>
-              <a:t>    </a:t>
-            </a:r>
-            <a:r>
-              <a:rPr lang="en-US" sz="900" b="1" dirty="0">
-                <a:solidFill>
-                  <a:srgbClr val="7F0055"/>
-                </a:solidFill>
-                <a:latin typeface="Consolas" panose="020B0609020204030204" pitchFamily="49" charset="0"/>
-              </a:rPr>
-              <a:t>bool</a:t>
-            </a:r>
-            <a:r>
-              <a:rPr lang="en-US" sz="900" b="1" dirty="0">
-                <a:solidFill>
-                  <a:srgbClr val="000000"/>
-                </a:solidFill>
-                <a:latin typeface="Consolas" panose="020B0609020204030204" pitchFamily="49" charset="0"/>
-              </a:rPr>
-              <a:t> </a:t>
-            </a:r>
-            <a:r>
-              <a:rPr lang="en-US" sz="900" b="1" dirty="0" err="1">
-                <a:solidFill>
-                  <a:srgbClr val="000000"/>
-                </a:solidFill>
-                <a:latin typeface="Consolas" panose="020B0609020204030204" pitchFamily="49" charset="0"/>
-              </a:rPr>
-              <a:t>rateZeroNode</a:t>
-            </a:r>
-            <a:r>
-              <a:rPr lang="en-US" sz="900" b="1" dirty="0">
-                <a:solidFill>
-                  <a:srgbClr val="000000"/>
-                </a:solidFill>
-                <a:latin typeface="Consolas" panose="020B0609020204030204" pitchFamily="49" charset="0"/>
-              </a:rPr>
-              <a:t> = </a:t>
-            </a:r>
-            <a:r>
-              <a:rPr lang="en-US" sz="900" b="1" dirty="0">
-                <a:solidFill>
-                  <a:srgbClr val="7F0055"/>
-                </a:solidFill>
-                <a:latin typeface="Consolas" panose="020B0609020204030204" pitchFamily="49" charset="0"/>
-              </a:rPr>
-              <a:t>true</a:t>
-            </a:r>
-            <a:r>
-              <a:rPr lang="en-US" sz="900" b="1" dirty="0">
-                <a:solidFill>
-                  <a:srgbClr val="000000"/>
-                </a:solidFill>
-                <a:latin typeface="Consolas" panose="020B0609020204030204" pitchFamily="49" charset="0"/>
-              </a:rPr>
-              <a:t>;</a:t>
-            </a:r>
-          </a:p>
-          <a:p>
-            <a:r>
-              <a:rPr lang="en-US" sz="900" dirty="0">
-                <a:solidFill>
-                  <a:srgbClr val="000000"/>
-                </a:solidFill>
-                <a:latin typeface="Consolas" panose="020B0609020204030204" pitchFamily="49" charset="0"/>
-              </a:rPr>
-              <a:t>    </a:t>
-            </a:r>
-            <a:r>
-              <a:rPr lang="en-US" sz="900" b="1" dirty="0">
-                <a:solidFill>
-                  <a:srgbClr val="7F0055"/>
-                </a:solidFill>
-                <a:latin typeface="Consolas" panose="020B0609020204030204" pitchFamily="49" charset="0"/>
-              </a:rPr>
-              <a:t>for</a:t>
-            </a:r>
-            <a:r>
-              <a:rPr lang="en-US" sz="900" b="1" dirty="0">
-                <a:solidFill>
-                  <a:srgbClr val="000000"/>
-                </a:solidFill>
-                <a:latin typeface="Consolas" panose="020B0609020204030204" pitchFamily="49" charset="0"/>
-              </a:rPr>
-              <a:t>(</a:t>
-            </a:r>
-            <a:r>
-              <a:rPr lang="en-US" sz="900" b="1" dirty="0">
-                <a:solidFill>
-                  <a:srgbClr val="7F0055"/>
-                </a:solidFill>
-                <a:latin typeface="Consolas" panose="020B0609020204030204" pitchFamily="49" charset="0"/>
-              </a:rPr>
-              <a:t>auto</a:t>
-            </a:r>
-            <a:r>
-              <a:rPr lang="en-US" sz="900" b="1" dirty="0">
-                <a:solidFill>
-                  <a:srgbClr val="000000"/>
-                </a:solidFill>
-                <a:latin typeface="Consolas" panose="020B0609020204030204" pitchFamily="49" charset="0"/>
-              </a:rPr>
-              <a:t> </a:t>
-            </a:r>
-            <a:r>
-              <a:rPr lang="en-US" sz="900" b="1" dirty="0" err="1">
-                <a:solidFill>
-                  <a:srgbClr val="000000"/>
-                </a:solidFill>
-                <a:latin typeface="Consolas" panose="020B0609020204030204" pitchFamily="49" charset="0"/>
-              </a:rPr>
-              <a:t>i</a:t>
-            </a:r>
-            <a:r>
-              <a:rPr lang="en-US" sz="900" b="1" dirty="0">
-                <a:solidFill>
-                  <a:srgbClr val="000000"/>
-                </a:solidFill>
-                <a:latin typeface="Consolas" panose="020B0609020204030204" pitchFamily="49" charset="0"/>
-              </a:rPr>
-              <a:t> = 0; </a:t>
-            </a:r>
-            <a:r>
-              <a:rPr lang="en-US" sz="900" b="1" dirty="0" err="1">
-                <a:solidFill>
-                  <a:srgbClr val="000000"/>
-                </a:solidFill>
-                <a:latin typeface="Consolas" panose="020B0609020204030204" pitchFamily="49" charset="0"/>
-              </a:rPr>
-              <a:t>i</a:t>
-            </a:r>
-            <a:r>
-              <a:rPr lang="en-US" sz="900" b="1" dirty="0">
-                <a:solidFill>
-                  <a:srgbClr val="000000"/>
-                </a:solidFill>
-                <a:latin typeface="Consolas" panose="020B0609020204030204" pitchFamily="49" charset="0"/>
-              </a:rPr>
-              <a:t> &lt; 256;i++) </a:t>
-            </a:r>
-            <a:r>
-              <a:rPr lang="en-US" sz="900" dirty="0">
-                <a:solidFill>
-                  <a:srgbClr val="000000"/>
-                </a:solidFill>
-                <a:latin typeface="Consolas" panose="020B0609020204030204" pitchFamily="49" charset="0"/>
-              </a:rPr>
-              <a:t>{  </a:t>
-            </a:r>
-          </a:p>
-          <a:p>
-            <a:r>
-              <a:rPr lang="en-US" sz="900" dirty="0">
-                <a:solidFill>
-                  <a:srgbClr val="000000"/>
-                </a:solidFill>
-                <a:latin typeface="Consolas" panose="020B0609020204030204" pitchFamily="49" charset="0"/>
-              </a:rPr>
-              <a:t>        </a:t>
-            </a:r>
-            <a:r>
-              <a:rPr lang="en-US" sz="900" b="1" dirty="0">
-                <a:solidFill>
-                  <a:srgbClr val="7F0055"/>
-                </a:solidFill>
-                <a:latin typeface="Consolas" panose="020B0609020204030204" pitchFamily="49" charset="0"/>
-              </a:rPr>
-              <a:t>if</a:t>
-            </a:r>
-            <a:r>
-              <a:rPr lang="en-US" sz="900" b="1" dirty="0">
-                <a:solidFill>
-                  <a:srgbClr val="000000"/>
-                </a:solidFill>
-                <a:latin typeface="Consolas" panose="020B0609020204030204" pitchFamily="49" charset="0"/>
-              </a:rPr>
-              <a:t>(</a:t>
-            </a:r>
-            <a:r>
-              <a:rPr lang="en-US" sz="900" b="1" dirty="0" err="1">
-                <a:solidFill>
-                  <a:srgbClr val="000000"/>
-                </a:solidFill>
-                <a:latin typeface="Consolas" panose="020B0609020204030204" pitchFamily="49" charset="0"/>
-              </a:rPr>
-              <a:t>frozenPattern</a:t>
-            </a:r>
-            <a:r>
-              <a:rPr lang="en-US" sz="900" b="1" dirty="0">
-                <a:solidFill>
-                  <a:srgbClr val="000000"/>
-                </a:solidFill>
-                <a:latin typeface="Consolas" panose="020B0609020204030204" pitchFamily="49" charset="0"/>
-              </a:rPr>
-              <a:t>[</a:t>
-            </a:r>
-            <a:r>
-              <a:rPr lang="en-US" sz="900" b="1" dirty="0" err="1">
-                <a:solidFill>
-                  <a:srgbClr val="000000"/>
-                </a:solidFill>
-                <a:latin typeface="Consolas" panose="020B0609020204030204" pitchFamily="49" charset="0"/>
-              </a:rPr>
-              <a:t>i</a:t>
-            </a:r>
-            <a:r>
-              <a:rPr lang="en-US" sz="900" b="1" dirty="0">
-                <a:solidFill>
-                  <a:srgbClr val="000000"/>
-                </a:solidFill>
-                <a:latin typeface="Consolas" panose="020B0609020204030204" pitchFamily="49" charset="0"/>
-              </a:rPr>
-              <a:t>] != 1) {   </a:t>
-            </a:r>
-          </a:p>
-          <a:p>
-            <a:r>
-              <a:rPr lang="en-US" sz="900" dirty="0">
-                <a:solidFill>
-                  <a:srgbClr val="000000"/>
-                </a:solidFill>
-                <a:latin typeface="Consolas" panose="020B0609020204030204" pitchFamily="49" charset="0"/>
-              </a:rPr>
-              <a:t>            </a:t>
-            </a:r>
-            <a:r>
-              <a:rPr lang="en-US" sz="900" dirty="0" err="1">
-                <a:solidFill>
-                  <a:srgbClr val="000000"/>
-                </a:solidFill>
-                <a:latin typeface="Consolas" panose="020B0609020204030204" pitchFamily="49" charset="0"/>
-              </a:rPr>
-              <a:t>rateZeroNode</a:t>
-            </a:r>
-            <a:r>
-              <a:rPr lang="en-US" sz="900" dirty="0">
-                <a:solidFill>
-                  <a:srgbClr val="000000"/>
-                </a:solidFill>
-                <a:latin typeface="Consolas" panose="020B0609020204030204" pitchFamily="49" charset="0"/>
-              </a:rPr>
-              <a:t> = </a:t>
-            </a:r>
-            <a:r>
-              <a:rPr lang="en-US" sz="900" b="1" dirty="0">
-                <a:solidFill>
-                  <a:srgbClr val="7F0055"/>
-                </a:solidFill>
-                <a:latin typeface="Consolas" panose="020B0609020204030204" pitchFamily="49" charset="0"/>
-              </a:rPr>
-              <a:t>false</a:t>
-            </a:r>
-            <a:r>
-              <a:rPr lang="en-US" sz="900" b="1" dirty="0">
-                <a:solidFill>
-                  <a:srgbClr val="000000"/>
-                </a:solidFill>
-                <a:latin typeface="Consolas" panose="020B0609020204030204" pitchFamily="49" charset="0"/>
-              </a:rPr>
-              <a:t>;</a:t>
-            </a:r>
-          </a:p>
-          <a:p>
-            <a:r>
-              <a:rPr lang="en-US" sz="900" dirty="0">
-                <a:solidFill>
-                  <a:srgbClr val="000000"/>
-                </a:solidFill>
-                <a:latin typeface="Consolas" panose="020B0609020204030204" pitchFamily="49" charset="0"/>
-              </a:rPr>
-              <a:t>            </a:t>
-            </a:r>
-            <a:r>
-              <a:rPr lang="en-US" sz="900" b="1" dirty="0">
-                <a:solidFill>
-                  <a:srgbClr val="7F0055"/>
-                </a:solidFill>
-                <a:latin typeface="Consolas" panose="020B0609020204030204" pitchFamily="49" charset="0"/>
-              </a:rPr>
-              <a:t>break</a:t>
-            </a:r>
-            <a:r>
-              <a:rPr lang="en-US" sz="900" b="1" dirty="0">
-                <a:solidFill>
-                  <a:srgbClr val="000000"/>
-                </a:solidFill>
-                <a:latin typeface="Consolas" panose="020B0609020204030204" pitchFamily="49" charset="0"/>
-              </a:rPr>
-              <a:t>;</a:t>
-            </a:r>
-          </a:p>
-          <a:p>
-            <a:r>
-              <a:rPr lang="en-US" sz="900" dirty="0">
-                <a:solidFill>
-                  <a:srgbClr val="000000"/>
-                </a:solidFill>
-                <a:latin typeface="Consolas" panose="020B0609020204030204" pitchFamily="49" charset="0"/>
-              </a:rPr>
-              <a:t>        }</a:t>
-            </a:r>
-          </a:p>
-          <a:p>
-            <a:r>
-              <a:rPr lang="en-US" sz="900" dirty="0">
-                <a:solidFill>
-                  <a:srgbClr val="000000"/>
-                </a:solidFill>
-                <a:latin typeface="Consolas" panose="020B0609020204030204" pitchFamily="49" charset="0"/>
-              </a:rPr>
-              <a:t>    }  </a:t>
-            </a:r>
-          </a:p>
-          <a:p>
-            <a:r>
-              <a:rPr lang="en-US" sz="900" dirty="0">
-                <a:solidFill>
-                  <a:srgbClr val="000000"/>
-                </a:solidFill>
-                <a:latin typeface="Consolas" panose="020B0609020204030204" pitchFamily="49" charset="0"/>
-              </a:rPr>
-              <a:t>    </a:t>
-            </a:r>
-            <a:r>
-              <a:rPr lang="en-US" sz="900" b="1" dirty="0">
-                <a:solidFill>
-                  <a:srgbClr val="7F0055"/>
-                </a:solidFill>
-                <a:latin typeface="Consolas" panose="020B0609020204030204" pitchFamily="49" charset="0"/>
-              </a:rPr>
-              <a:t>return</a:t>
-            </a:r>
-            <a:r>
-              <a:rPr lang="en-US" sz="900" b="1" dirty="0">
-                <a:solidFill>
-                  <a:srgbClr val="000000"/>
-                </a:solidFill>
-                <a:latin typeface="Consolas" panose="020B0609020204030204" pitchFamily="49" charset="0"/>
-              </a:rPr>
-              <a:t> </a:t>
-            </a:r>
-            <a:r>
-              <a:rPr lang="en-US" sz="900" b="1" dirty="0" err="1">
-                <a:solidFill>
-                  <a:srgbClr val="000000"/>
-                </a:solidFill>
-                <a:latin typeface="Consolas" panose="020B0609020204030204" pitchFamily="49" charset="0"/>
-              </a:rPr>
-              <a:t>rateZeroNode</a:t>
-            </a:r>
-            <a:r>
-              <a:rPr lang="en-US" sz="900" b="1" dirty="0">
-                <a:solidFill>
-                  <a:srgbClr val="000000"/>
-                </a:solidFill>
-                <a:latin typeface="Consolas" panose="020B0609020204030204" pitchFamily="49" charset="0"/>
-              </a:rPr>
-              <a:t>; </a:t>
-            </a:r>
-          </a:p>
-          <a:p>
-            <a:r>
-              <a:rPr lang="en-US" sz="900" dirty="0">
-                <a:solidFill>
-                  <a:srgbClr val="000000"/>
-                </a:solidFill>
-                <a:latin typeface="Consolas" panose="020B0609020204030204" pitchFamily="49" charset="0"/>
-              </a:rPr>
-              <a:t>}</a:t>
-            </a:r>
-            <a:endParaRPr lang="en-US" sz="900" dirty="0"/>
-          </a:p>
-        </p:txBody>
-      </p:sp>
-      <p:sp>
-        <p:nvSpPr>
-          <p:cNvPr id="3" name="Slide Number Placeholder 2"/>
-          <p:cNvSpPr>
-            <a:spLocks noGrp="1"/>
-          </p:cNvSpPr>
-          <p:nvPr>
-            <p:ph type="sldNum" sz="quarter" idx="11"/>
-          </p:nvPr>
-        </p:nvSpPr>
-        <p:spPr/>
-        <p:txBody>
-          <a:bodyPr/>
-          <a:lstStyle/>
-          <a:p>
-            <a:fld id="{CE58CB1E-F828-4F11-99E0-327109AF9DA4}" type="slidenum">
-              <a:rPr lang="de-DE" smtClean="0"/>
-              <a:pPr/>
-              <a:t>20</a:t>
-            </a:fld>
-            <a:endParaRPr lang="de-DE" dirty="0"/>
-          </a:p>
-        </p:txBody>
-      </p:sp>
-      <p:sp>
-        <p:nvSpPr>
-          <p:cNvPr id="4" name="Title 3"/>
-          <p:cNvSpPr>
-            <a:spLocks noGrp="1"/>
-          </p:cNvSpPr>
-          <p:nvPr>
-            <p:ph type="title"/>
-          </p:nvPr>
-        </p:nvSpPr>
-        <p:spPr>
-          <a:xfrm>
-            <a:off x="318009" y="706009"/>
-            <a:ext cx="8508999" cy="410369"/>
-          </a:xfrm>
-        </p:spPr>
-        <p:txBody>
-          <a:bodyPr/>
-          <a:lstStyle/>
-          <a:p>
-            <a:r>
-              <a:rPr lang="en-US" dirty="0">
-                <a:solidFill>
-                  <a:schemeClr val="bg2"/>
-                </a:solidFill>
-              </a:rPr>
-              <a:t>Polar decoding: Packing frozen pattern</a:t>
-            </a:r>
-          </a:p>
-        </p:txBody>
-      </p:sp>
-      <p:sp>
-        <p:nvSpPr>
-          <p:cNvPr id="187" name="TextBox 186"/>
-          <p:cNvSpPr txBox="1"/>
-          <p:nvPr/>
-        </p:nvSpPr>
-        <p:spPr>
-          <a:xfrm>
-            <a:off x="1007258" y="3897824"/>
-            <a:ext cx="1014632" cy="257250"/>
-          </a:xfrm>
-          <a:prstGeom prst="rect">
-            <a:avLst/>
-          </a:prstGeom>
-          <a:noFill/>
-        </p:spPr>
-        <p:txBody>
-          <a:bodyPr wrap="square" lIns="0" tIns="0" rIns="0" bIns="0" rtlCol="0">
-            <a:spAutoFit/>
-          </a:bodyPr>
-          <a:lstStyle/>
-          <a:p>
-            <a:pPr>
-              <a:lnSpc>
-                <a:spcPct val="114000"/>
-              </a:lnSpc>
-            </a:pPr>
-            <a:r>
-              <a:rPr lang="en-US" sz="1600" dirty="0">
-                <a:latin typeface="+mn-lt"/>
-              </a:rPr>
-              <a:t>Naive way</a:t>
-            </a:r>
-          </a:p>
-        </p:txBody>
-      </p:sp>
-      <p:sp>
-        <p:nvSpPr>
-          <p:cNvPr id="196" name="TextBox 195"/>
-          <p:cNvSpPr txBox="1"/>
-          <p:nvPr/>
-        </p:nvSpPr>
-        <p:spPr>
-          <a:xfrm>
-            <a:off x="4715973" y="3874356"/>
-            <a:ext cx="2126529" cy="280718"/>
-          </a:xfrm>
-          <a:prstGeom prst="rect">
-            <a:avLst/>
-          </a:prstGeom>
-          <a:noFill/>
-        </p:spPr>
-        <p:txBody>
-          <a:bodyPr wrap="square" lIns="0" tIns="0" rIns="0" bIns="0" rtlCol="0">
-            <a:spAutoFit/>
-          </a:bodyPr>
-          <a:lstStyle/>
-          <a:p>
-            <a:pPr>
-              <a:lnSpc>
-                <a:spcPct val="114000"/>
-              </a:lnSpc>
-            </a:pPr>
-            <a:r>
-              <a:rPr lang="en-US" sz="1600" dirty="0">
-                <a:latin typeface="+mn-lt"/>
-              </a:rPr>
-              <a:t>Efficient SIMD way</a:t>
-            </a:r>
-          </a:p>
-        </p:txBody>
-      </p:sp>
-      <p:sp>
-        <p:nvSpPr>
-          <p:cNvPr id="201" name="Rectangle 200"/>
-          <p:cNvSpPr/>
-          <p:nvPr/>
-        </p:nvSpPr>
-        <p:spPr>
-          <a:xfrm>
-            <a:off x="4255007" y="4164351"/>
-            <a:ext cx="4572000" cy="1892826"/>
-          </a:xfrm>
-          <a:prstGeom prst="rect">
-            <a:avLst/>
-          </a:prstGeom>
-        </p:spPr>
-        <p:txBody>
-          <a:bodyPr>
-            <a:spAutoFit/>
-          </a:bodyPr>
-          <a:lstStyle/>
-          <a:p>
-            <a:r>
-              <a:rPr lang="en-US" sz="900" b="1" dirty="0">
-                <a:solidFill>
-                  <a:srgbClr val="7F0055"/>
-                </a:solidFill>
-                <a:latin typeface="Consolas" panose="020B0609020204030204" pitchFamily="49" charset="0"/>
-              </a:rPr>
-              <a:t>template</a:t>
-            </a:r>
-            <a:r>
-              <a:rPr lang="en-US" sz="900" b="1" dirty="0">
-                <a:solidFill>
-                  <a:srgbClr val="000000"/>
-                </a:solidFill>
-                <a:latin typeface="Consolas" panose="020B0609020204030204" pitchFamily="49" charset="0"/>
-              </a:rPr>
-              <a:t>&lt;&gt;</a:t>
-            </a:r>
-          </a:p>
-          <a:p>
-            <a:r>
-              <a:rPr lang="en-US" sz="900" b="1" dirty="0">
-                <a:solidFill>
-                  <a:srgbClr val="7F0055"/>
-                </a:solidFill>
-                <a:latin typeface="Consolas" panose="020B0609020204030204" pitchFamily="49" charset="0"/>
-              </a:rPr>
-              <a:t>inline</a:t>
-            </a:r>
-            <a:r>
-              <a:rPr lang="en-US" sz="900" b="1" dirty="0">
-                <a:solidFill>
-                  <a:srgbClr val="000000"/>
-                </a:solidFill>
-                <a:latin typeface="Consolas" panose="020B0609020204030204" pitchFamily="49" charset="0"/>
-              </a:rPr>
-              <a:t> </a:t>
-            </a:r>
-            <a:r>
-              <a:rPr lang="en-US" sz="900" b="1" dirty="0">
-                <a:solidFill>
-                  <a:srgbClr val="7F0055"/>
-                </a:solidFill>
-                <a:latin typeface="Consolas" panose="020B0609020204030204" pitchFamily="49" charset="0"/>
-              </a:rPr>
-              <a:t>bool</a:t>
-            </a:r>
-            <a:r>
-              <a:rPr lang="en-US" sz="900" b="1" dirty="0">
-                <a:solidFill>
-                  <a:srgbClr val="000000"/>
-                </a:solidFill>
-                <a:latin typeface="Consolas" panose="020B0609020204030204" pitchFamily="49" charset="0"/>
-              </a:rPr>
-              <a:t> </a:t>
-            </a:r>
-            <a:r>
-              <a:rPr lang="de-DE" sz="900" b="1" dirty="0" err="1">
-                <a:solidFill>
-                  <a:srgbClr val="000000"/>
-                </a:solidFill>
-                <a:latin typeface="Consolas" panose="020B0609020204030204" pitchFamily="49" charset="0"/>
-              </a:rPr>
-              <a:t>isRateZeroNode</a:t>
-            </a:r>
-            <a:r>
-              <a:rPr lang="de-DE" sz="900" b="1" dirty="0">
-                <a:solidFill>
-                  <a:srgbClr val="000000"/>
-                </a:solidFill>
-                <a:latin typeface="Consolas" panose="020B0609020204030204" pitchFamily="49" charset="0"/>
-              </a:rPr>
-              <a:t>(</a:t>
-            </a:r>
-            <a:r>
-              <a:rPr lang="en-US" sz="900" b="1" dirty="0">
-                <a:solidFill>
-                  <a:srgbClr val="005032"/>
-                </a:solidFill>
-                <a:latin typeface="Consolas" panose="020B0609020204030204" pitchFamily="49" charset="0"/>
-              </a:rPr>
-              <a:t>uint64_t</a:t>
-            </a:r>
-            <a:r>
-              <a:rPr lang="en-US" sz="900" b="1" dirty="0">
-                <a:solidFill>
-                  <a:srgbClr val="000000"/>
-                </a:solidFill>
-                <a:latin typeface="Consolas" panose="020B0609020204030204" pitchFamily="49" charset="0"/>
-              </a:rPr>
-              <a:t> s[]) {</a:t>
-            </a:r>
-          </a:p>
-          <a:p>
-            <a:endParaRPr lang="en-US" sz="900" dirty="0">
-              <a:latin typeface="Consolas" panose="020B0609020204030204" pitchFamily="49" charset="0"/>
-            </a:endParaRPr>
-          </a:p>
-          <a:p>
-            <a:r>
-              <a:rPr lang="en-US" sz="900" dirty="0">
-                <a:solidFill>
-                  <a:srgbClr val="000000"/>
-                </a:solidFill>
-                <a:latin typeface="Consolas" panose="020B0609020204030204" pitchFamily="49" charset="0"/>
-              </a:rPr>
-              <a:t>    </a:t>
-            </a:r>
-            <a:r>
-              <a:rPr lang="en-US" sz="900" dirty="0">
-                <a:solidFill>
-                  <a:srgbClr val="005032"/>
-                </a:solidFill>
-                <a:latin typeface="Consolas" panose="020B0609020204030204" pitchFamily="49" charset="0"/>
-              </a:rPr>
-              <a:t>__m256i</a:t>
-            </a:r>
-            <a:r>
-              <a:rPr lang="en-US" sz="900" dirty="0">
-                <a:solidFill>
-                  <a:srgbClr val="000000"/>
-                </a:solidFill>
-                <a:latin typeface="Consolas" panose="020B0609020204030204" pitchFamily="49" charset="0"/>
-              </a:rPr>
-              <a:t> temp1 = _mm256_loadu_si256 ((</a:t>
-            </a:r>
-            <a:r>
-              <a:rPr lang="en-US" sz="900" dirty="0">
-                <a:solidFill>
-                  <a:srgbClr val="005032"/>
-                </a:solidFill>
-                <a:latin typeface="Consolas" panose="020B0609020204030204" pitchFamily="49" charset="0"/>
-              </a:rPr>
-              <a:t>__m256i</a:t>
-            </a:r>
-            <a:r>
-              <a:rPr lang="en-US" sz="900" dirty="0">
-                <a:solidFill>
-                  <a:srgbClr val="000000"/>
-                </a:solidFill>
-                <a:latin typeface="Consolas" panose="020B0609020204030204" pitchFamily="49" charset="0"/>
-              </a:rPr>
-              <a:t>*)s);</a:t>
-            </a:r>
-          </a:p>
-          <a:p>
-            <a:r>
-              <a:rPr lang="en-US" sz="900" dirty="0">
-                <a:solidFill>
-                  <a:srgbClr val="000000"/>
-                </a:solidFill>
-                <a:latin typeface="Consolas" panose="020B0609020204030204" pitchFamily="49" charset="0"/>
-              </a:rPr>
-              <a:t>    </a:t>
-            </a:r>
-            <a:r>
-              <a:rPr lang="en-US" sz="900" dirty="0">
-                <a:solidFill>
-                  <a:srgbClr val="005032"/>
-                </a:solidFill>
-                <a:latin typeface="Consolas" panose="020B0609020204030204" pitchFamily="49" charset="0"/>
-              </a:rPr>
-              <a:t>__m256i</a:t>
-            </a:r>
-            <a:r>
-              <a:rPr lang="en-US" sz="900" dirty="0">
-                <a:solidFill>
-                  <a:srgbClr val="000000"/>
-                </a:solidFill>
-                <a:latin typeface="Consolas" panose="020B0609020204030204" pitchFamily="49" charset="0"/>
-              </a:rPr>
-              <a:t> temp2;</a:t>
-            </a:r>
-            <a:endParaRPr lang="en-US" sz="900" dirty="0">
-              <a:latin typeface="Consolas" panose="020B0609020204030204" pitchFamily="49" charset="0"/>
-            </a:endParaRPr>
-          </a:p>
-          <a:p>
-            <a:r>
-              <a:rPr lang="en-US" sz="900" dirty="0">
-                <a:solidFill>
-                  <a:srgbClr val="000000"/>
-                </a:solidFill>
-                <a:latin typeface="Consolas" panose="020B0609020204030204" pitchFamily="49" charset="0"/>
-              </a:rPr>
-              <a:t>    temp2 = _mm256_set1_epi8 ((</a:t>
-            </a:r>
-            <a:r>
-              <a:rPr lang="en-US" sz="900" b="1" dirty="0">
-                <a:solidFill>
-                  <a:srgbClr val="7F0055"/>
-                </a:solidFill>
-                <a:latin typeface="Consolas" panose="020B0609020204030204" pitchFamily="49" charset="0"/>
-              </a:rPr>
-              <a:t>char</a:t>
-            </a:r>
-            <a:r>
-              <a:rPr lang="en-US" sz="900" b="1" dirty="0">
-                <a:solidFill>
-                  <a:srgbClr val="000000"/>
-                </a:solidFill>
-                <a:latin typeface="Consolas" panose="020B0609020204030204" pitchFamily="49" charset="0"/>
-              </a:rPr>
-              <a:t>)0xFF);</a:t>
-            </a:r>
-          </a:p>
-          <a:p>
-            <a:endParaRPr lang="en-US" sz="900" b="1" dirty="0">
-              <a:solidFill>
-                <a:srgbClr val="000000"/>
-              </a:solidFill>
-              <a:latin typeface="Consolas" panose="020B0609020204030204" pitchFamily="49" charset="0"/>
-            </a:endParaRPr>
-          </a:p>
-          <a:p>
-            <a:r>
-              <a:rPr lang="en-US" sz="900" dirty="0">
-                <a:solidFill>
-                  <a:srgbClr val="005032"/>
-                </a:solidFill>
-                <a:latin typeface="Consolas" panose="020B0609020204030204" pitchFamily="49" charset="0"/>
-              </a:rPr>
-              <a:t>    __m256i</a:t>
-            </a:r>
-            <a:r>
-              <a:rPr lang="en-US" sz="900" dirty="0">
-                <a:solidFill>
-                  <a:srgbClr val="000000"/>
-                </a:solidFill>
-                <a:latin typeface="Consolas" panose="020B0609020204030204" pitchFamily="49" charset="0"/>
-              </a:rPr>
-              <a:t> </a:t>
-            </a:r>
-            <a:r>
-              <a:rPr lang="en-US" sz="900" dirty="0" err="1">
-                <a:solidFill>
-                  <a:srgbClr val="000000"/>
-                </a:solidFill>
-                <a:latin typeface="Consolas" panose="020B0609020204030204" pitchFamily="49" charset="0"/>
-              </a:rPr>
-              <a:t>pcmp</a:t>
-            </a:r>
-            <a:r>
-              <a:rPr lang="en-US" sz="900" dirty="0">
-                <a:solidFill>
-                  <a:srgbClr val="000000"/>
-                </a:solidFill>
-                <a:latin typeface="Consolas" panose="020B0609020204030204" pitchFamily="49" charset="0"/>
-              </a:rPr>
-              <a:t> = _mm256_cmpeq_epi64 (temp1, temp2);</a:t>
-            </a:r>
-          </a:p>
-          <a:p>
-            <a:endParaRPr lang="en-US" sz="900" dirty="0">
-              <a:latin typeface="Consolas" panose="020B0609020204030204" pitchFamily="49" charset="0"/>
-            </a:endParaRPr>
-          </a:p>
-          <a:p>
-            <a:r>
-              <a:rPr lang="en-US" sz="900" dirty="0">
-                <a:solidFill>
-                  <a:srgbClr val="000000"/>
-                </a:solidFill>
-                <a:latin typeface="Consolas" panose="020B0609020204030204" pitchFamily="49" charset="0"/>
-              </a:rPr>
-              <a:t>    </a:t>
-            </a:r>
-            <a:r>
-              <a:rPr lang="en-US" sz="900" b="1" dirty="0">
-                <a:solidFill>
-                  <a:srgbClr val="7F0055"/>
-                </a:solidFill>
-                <a:latin typeface="Consolas" panose="020B0609020204030204" pitchFamily="49" charset="0"/>
-              </a:rPr>
-              <a:t>unsigned</a:t>
-            </a:r>
-            <a:r>
-              <a:rPr lang="en-US" sz="900" b="1" dirty="0">
-                <a:solidFill>
-                  <a:srgbClr val="000000"/>
-                </a:solidFill>
-                <a:latin typeface="Consolas" panose="020B0609020204030204" pitchFamily="49" charset="0"/>
-              </a:rPr>
-              <a:t> bitmask = _mm256_movemask_epi8(</a:t>
-            </a:r>
-            <a:r>
-              <a:rPr lang="en-US" sz="900" b="1" dirty="0" err="1">
-                <a:solidFill>
-                  <a:srgbClr val="000000"/>
-                </a:solidFill>
-                <a:latin typeface="Consolas" panose="020B0609020204030204" pitchFamily="49" charset="0"/>
-              </a:rPr>
-              <a:t>pcmp</a:t>
-            </a:r>
-            <a:r>
-              <a:rPr lang="en-US" sz="900" b="1" dirty="0">
-                <a:solidFill>
-                  <a:srgbClr val="000000"/>
-                </a:solidFill>
-                <a:latin typeface="Consolas" panose="020B0609020204030204" pitchFamily="49" charset="0"/>
-              </a:rPr>
-              <a:t>);</a:t>
-            </a:r>
-          </a:p>
-          <a:p>
-            <a:endParaRPr lang="en-US" sz="900" dirty="0">
-              <a:latin typeface="Consolas" panose="020B0609020204030204" pitchFamily="49" charset="0"/>
-            </a:endParaRPr>
-          </a:p>
-          <a:p>
-            <a:r>
-              <a:rPr lang="en-US" sz="900" dirty="0">
-                <a:solidFill>
-                  <a:srgbClr val="000000"/>
-                </a:solidFill>
-                <a:latin typeface="Consolas" panose="020B0609020204030204" pitchFamily="49" charset="0"/>
-              </a:rPr>
-              <a:t>    </a:t>
-            </a:r>
-            <a:r>
-              <a:rPr lang="en-US" sz="900" b="1" dirty="0">
-                <a:solidFill>
-                  <a:srgbClr val="7F0055"/>
-                </a:solidFill>
-                <a:latin typeface="Consolas" panose="020B0609020204030204" pitchFamily="49" charset="0"/>
-              </a:rPr>
-              <a:t>return</a:t>
-            </a:r>
-            <a:r>
-              <a:rPr lang="en-US" sz="900" b="1" dirty="0">
-                <a:solidFill>
-                  <a:srgbClr val="000000"/>
-                </a:solidFill>
-                <a:latin typeface="Consolas" panose="020B0609020204030204" pitchFamily="49" charset="0"/>
-              </a:rPr>
-              <a:t> (bitmask == 0xffffffffU);</a:t>
-            </a:r>
-          </a:p>
-          <a:p>
-            <a:r>
-              <a:rPr lang="en-US" sz="900" dirty="0">
-                <a:solidFill>
-                  <a:srgbClr val="000000"/>
-                </a:solidFill>
-                <a:latin typeface="Consolas" panose="020B0609020204030204" pitchFamily="49" charset="0"/>
-              </a:rPr>
-              <a:t>}</a:t>
-            </a:r>
-            <a:endParaRPr lang="en-US" sz="900" dirty="0"/>
-          </a:p>
-        </p:txBody>
-      </p:sp>
-      <p:sp>
-        <p:nvSpPr>
-          <p:cNvPr id="639" name="RS_Classification_Standard"/>
-          <p:cNvSpPr txBox="1"/>
-          <p:nvPr/>
-        </p:nvSpPr>
-        <p:spPr>
-          <a:xfrm>
-            <a:off x="8990047" y="6187613"/>
-            <a:ext cx="153953" cy="251287"/>
-          </a:xfrm>
-          <a:prstGeom prst="rect">
-            <a:avLst/>
-          </a:prstGeom>
-          <a:solidFill>
-            <a:srgbClr val="FFFFFF">
-              <a:alpha val="0"/>
-            </a:srgbClr>
-          </a:solidFill>
-        </p:spPr>
-        <p:txBody>
-          <a:bodyPr vert="horz" wrap="none" lIns="76200" tIns="36830" rIns="76200" bIns="36830" rtlCol="0" anchor="ctr">
-            <a:spAutoFit/>
-          </a:bodyPr>
-          <a:lstStyle/>
-          <a:p>
-            <a:endParaRPr lang="en-US" sz="1100" b="1" kern="900" spc="100" dirty="0" err="1">
-              <a:solidFill>
-                <a:srgbClr val="000000"/>
-              </a:solidFill>
-              <a:latin typeface="+mn-lt"/>
-            </a:endParaRPr>
-          </a:p>
-        </p:txBody>
-      </p:sp>
-    </p:spTree>
-    <p:custDataLst>
-      <p:tags r:id="rId1"/>
-    </p:custDataLst>
-    <p:extLst>
-      <p:ext uri="{BB962C8B-B14F-4D97-AF65-F5344CB8AC3E}">
-        <p14:creationId xmlns:p14="http://schemas.microsoft.com/office/powerpoint/2010/main" val="3260881012"/>
-      </p:ext>
-    </p:extLst>
-  </p:cSld>
-  <p:clrMapOvr>
-    <a:masterClrMapping/>
-  </p:clrMapOvr>
-</p:sld>
-</file>
-
-<file path=ppt/slides/slide21.xml><?xml version="1.0" encoding="utf-8"?>
-<p:sld xmlns:a="http://schemas.openxmlformats.org/drawingml/2006/main" xmlns:r="http://schemas.openxmlformats.org/officeDocument/2006/relationships" xmlns:p="http://schemas.openxmlformats.org/presentationml/2006/main">
-  <p:cSld>
-    <p:spTree>
-      <p:nvGrpSpPr>
-        <p:cNvPr id="1" name=""/>
-        <p:cNvGrpSpPr/>
-        <p:nvPr/>
-      </p:nvGrpSpPr>
-      <p:grpSpPr>
-        <a:xfrm>
-          <a:off x="0" y="0"/>
-          <a:ext cx="0" cy="0"/>
-          <a:chOff x="0" y="0"/>
-          <a:chExt cx="0" cy="0"/>
-        </a:xfrm>
-      </p:grpSpPr>
-      <mc:AlternateContent xmlns:mc="http://schemas.openxmlformats.org/markup-compatibility/2006" xmlns:a14="http://schemas.microsoft.com/office/drawing/2010/main">
-        <mc:Choice Requires="a14">
+      <mc:AlternateContent xmlns:mc="http://schemas.openxmlformats.org/markup-compatibility/2006">
+        <mc:Choice xmlns:a14="http://schemas.microsoft.com/office/drawing/2010/main" Requires="a14">
           <p:sp>
             <p:nvSpPr>
               <p:cNvPr id="2" name="Content Placeholder 1"/>
@@ -19009,7 +17804,7 @@
             </p:nvSpPr>
             <p:spPr>
               <a:xfrm>
-                <a:off x="330693" y="1301409"/>
+                <a:off x="318009" y="1723491"/>
                 <a:ext cx="8508999" cy="4699572"/>
               </a:xfrm>
             </p:spPr>
@@ -19325,7 +18120,7 @@
             </p:txBody>
           </p:sp>
         </mc:Choice>
-        <mc:Fallback xmlns="">
+        <mc:Fallback>
           <p:sp>
             <p:nvSpPr>
               <p:cNvPr id="2" name="Content Placeholder 1"/>
@@ -19338,13 +18133,13 @@
             </p:nvSpPr>
             <p:spPr>
               <a:xfrm>
-                <a:off x="330693" y="1301409"/>
+                <a:off x="318009" y="1723491"/>
                 <a:ext cx="8508999" cy="4699572"/>
               </a:xfrm>
               <a:blipFill>
                 <a:blip r:embed="rId3"/>
                 <a:stretch>
-                  <a:fillRect l="-1648" t="-1038"/>
+                  <a:fillRect l="-1648" t="-1167"/>
                 </a:stretch>
               </a:blipFill>
             </p:spPr>
@@ -19381,7 +18176,7 @@
             <a:fld id="{CE58CB1E-F828-4F11-99E0-327109AF9DA4}" type="slidenum">
               <a:rPr lang="de-DE" smtClean="0"/>
               <a:pPr/>
-              <a:t>21</a:t>
+              <a:t>20</a:t>
             </a:fld>
             <a:endParaRPr lang="de-DE" dirty="0"/>
           </a:p>
@@ -19399,8 +18194,8 @@
         </p:nvSpPr>
         <p:spPr>
           <a:xfrm>
-            <a:off x="318009" y="654874"/>
-            <a:ext cx="8508999" cy="410369"/>
+            <a:off x="304308" y="654874"/>
+            <a:ext cx="8508999" cy="820738"/>
           </a:xfrm>
         </p:spPr>
         <p:txBody>
@@ -19413,7 +18208,7 @@
                   <a:schemeClr val="bg2"/>
                 </a:solidFill>
               </a:rPr>
-              <a:t>Optimized CN, VN and bit combination operations</a:t>
+              <a:t>Polar decoding: Optimized CN, VN and bit combination operations</a:t>
             </a:r>
           </a:p>
         </p:txBody>
@@ -21645,6 +20440,1136 @@
 </p:sld>
 </file>
 
+<file path=ppt/slides/slide21.xml><?xml version="1.0" encoding="utf-8"?>
+<p:sld xmlns:a="http://schemas.openxmlformats.org/drawingml/2006/main" xmlns:r="http://schemas.openxmlformats.org/officeDocument/2006/relationships" xmlns:p="http://schemas.openxmlformats.org/presentationml/2006/main">
+  <p:cSld>
+    <p:spTree>
+      <p:nvGrpSpPr>
+        <p:cNvPr id="1" name=""/>
+        <p:cNvGrpSpPr/>
+        <p:nvPr/>
+      </p:nvGrpSpPr>
+      <p:grpSpPr>
+        <a:xfrm>
+          <a:off x="0" y="0"/>
+          <a:ext cx="0" cy="0"/>
+          <a:chOff x="0" y="0"/>
+          <a:chExt cx="0" cy="0"/>
+        </a:xfrm>
+      </p:grpSpPr>
+      <p:sp>
+        <p:nvSpPr>
+          <p:cNvPr id="2" name="Content Placeholder 1"/>
+          <p:cNvSpPr>
+            <a:spLocks noGrp="1"/>
+          </p:cNvSpPr>
+          <p:nvPr>
+            <p:ph idx="1"/>
+          </p:nvPr>
+        </p:nvSpPr>
+        <p:spPr>
+          <a:xfrm>
+            <a:off x="318008" y="1445059"/>
+            <a:ext cx="8508999" cy="4699572"/>
+          </a:xfrm>
+        </p:spPr>
+        <p:txBody>
+          <a:bodyPr/>
+          <a:lstStyle/>
+          <a:p>
+            <a:pPr marL="285750" indent="-285750">
+              <a:buFont typeface="Arial" panose="020B0604020202020204" pitchFamily="34" charset="0"/>
+              <a:buChar char="•"/>
+            </a:pPr>
+            <a:r>
+              <a:rPr lang="en-US" dirty="0"/>
+              <a:t>Packing multiple frozen bits allows efficient identification of component codes.</a:t>
+            </a:r>
+          </a:p>
+          <a:p>
+            <a:pPr marL="285750" indent="-285750">
+              <a:buFont typeface="Arial" panose="020B0604020202020204" pitchFamily="34" charset="0"/>
+              <a:buChar char="•"/>
+            </a:pPr>
+            <a:r>
+              <a:rPr lang="en-US" dirty="0"/>
+              <a:t>Frozen pattern is passed in packed bit format to decoder.</a:t>
+            </a:r>
+          </a:p>
+          <a:p>
+            <a:pPr marL="285750" indent="-285750">
+              <a:buFont typeface="Arial" panose="020B0604020202020204" pitchFamily="34" charset="0"/>
+              <a:buChar char="•"/>
+            </a:pPr>
+            <a:r>
+              <a:rPr lang="en-US" dirty="0"/>
+              <a:t>Identification component codes is performed at run time.</a:t>
+            </a:r>
+          </a:p>
+          <a:p>
+            <a:pPr marL="285750" indent="-285750">
+              <a:buFont typeface="Arial" panose="020B0604020202020204" pitchFamily="34" charset="0"/>
+              <a:buChar char="•"/>
+            </a:pPr>
+            <a:r>
+              <a:rPr lang="en-US" dirty="0"/>
+              <a:t>Packing of multiple bits together allows identification of component codes in a single comparison instruction.</a:t>
+            </a:r>
+          </a:p>
+          <a:p>
+            <a:pPr marL="285750" indent="-285750">
+              <a:buFont typeface="Arial" panose="020B0604020202020204" pitchFamily="34" charset="0"/>
+              <a:buChar char="•"/>
+            </a:pPr>
+            <a:r>
+              <a:rPr lang="en-US" dirty="0"/>
+              <a:t>Reduces the expensive branch instructions and exploits data parallelism.</a:t>
+            </a:r>
+          </a:p>
+          <a:p>
+            <a:pPr marL="285750" indent="-285750">
+              <a:buFont typeface="Arial" panose="020B0604020202020204" pitchFamily="34" charset="0"/>
+              <a:buChar char="•"/>
+            </a:pPr>
+            <a:endParaRPr lang="en-US" dirty="0"/>
+          </a:p>
+          <a:p>
+            <a:pPr marL="285750" indent="-285750">
+              <a:buFont typeface="Arial" panose="020B0604020202020204" pitchFamily="34" charset="0"/>
+              <a:buChar char="•"/>
+            </a:pPr>
+            <a:r>
+              <a:rPr lang="en-US" dirty="0"/>
+              <a:t>For frozen pattern at child node  = {1,1……..1,1} //256 values.</a:t>
+            </a:r>
+          </a:p>
+          <a:p>
+            <a:pPr marL="285750" indent="-285750">
+              <a:buFont typeface="Arial" panose="020B0604020202020204" pitchFamily="34" charset="0"/>
+              <a:buChar char="•"/>
+            </a:pPr>
+            <a:endParaRPr lang="en-US" dirty="0"/>
+          </a:p>
+          <a:p>
+            <a:endParaRPr lang="en-US" dirty="0"/>
+          </a:p>
+          <a:p>
+            <a:r>
+              <a:rPr lang="de-DE" sz="900" b="1" dirty="0" err="1">
+                <a:solidFill>
+                  <a:srgbClr val="7F0055"/>
+                </a:solidFill>
+                <a:latin typeface="Consolas" panose="020B0609020204030204" pitchFamily="49" charset="0"/>
+              </a:rPr>
+              <a:t>bool</a:t>
+            </a:r>
+            <a:r>
+              <a:rPr lang="de-DE" sz="900" b="1" dirty="0">
+                <a:solidFill>
+                  <a:srgbClr val="000000"/>
+                </a:solidFill>
+                <a:latin typeface="Consolas" panose="020B0609020204030204" pitchFamily="49" charset="0"/>
+              </a:rPr>
+              <a:t> </a:t>
+            </a:r>
+            <a:r>
+              <a:rPr lang="de-DE" sz="900" b="1" dirty="0" err="1">
+                <a:solidFill>
+                  <a:srgbClr val="000000"/>
+                </a:solidFill>
+                <a:latin typeface="Consolas" panose="020B0609020204030204" pitchFamily="49" charset="0"/>
+              </a:rPr>
+              <a:t>isRateZeroNode</a:t>
+            </a:r>
+            <a:r>
+              <a:rPr lang="de-DE" sz="900" b="1" dirty="0">
+                <a:solidFill>
+                  <a:srgbClr val="000000"/>
+                </a:solidFill>
+                <a:latin typeface="Consolas" panose="020B0609020204030204" pitchFamily="49" charset="0"/>
+              </a:rPr>
+              <a:t>(</a:t>
+            </a:r>
+            <a:r>
+              <a:rPr lang="de-DE" sz="900" b="1" dirty="0">
+                <a:solidFill>
+                  <a:srgbClr val="005032"/>
+                </a:solidFill>
+                <a:latin typeface="Consolas" panose="020B0609020204030204" pitchFamily="49" charset="0"/>
+              </a:rPr>
+              <a:t>int8_t</a:t>
+            </a:r>
+            <a:r>
+              <a:rPr lang="de-DE" sz="900" b="1" dirty="0">
+                <a:solidFill>
+                  <a:srgbClr val="000000"/>
+                </a:solidFill>
+                <a:latin typeface="Consolas" panose="020B0609020204030204" pitchFamily="49" charset="0"/>
+              </a:rPr>
+              <a:t> </a:t>
+            </a:r>
+            <a:r>
+              <a:rPr lang="de-DE" sz="900" b="1" dirty="0" err="1">
+                <a:solidFill>
+                  <a:srgbClr val="000000"/>
+                </a:solidFill>
+                <a:latin typeface="Consolas" panose="020B0609020204030204" pitchFamily="49" charset="0"/>
+              </a:rPr>
+              <a:t>frozenPattern</a:t>
+            </a:r>
+            <a:r>
+              <a:rPr lang="de-DE" sz="900" b="1" dirty="0">
+                <a:solidFill>
+                  <a:srgbClr val="000000"/>
+                </a:solidFill>
+                <a:latin typeface="Consolas" panose="020B0609020204030204" pitchFamily="49" charset="0"/>
+              </a:rPr>
+              <a:t>[])</a:t>
+            </a:r>
+          </a:p>
+          <a:p>
+            <a:r>
+              <a:rPr lang="en-US" sz="900" dirty="0">
+                <a:solidFill>
+                  <a:srgbClr val="000000"/>
+                </a:solidFill>
+                <a:latin typeface="Consolas" panose="020B0609020204030204" pitchFamily="49" charset="0"/>
+              </a:rPr>
+              <a:t>{</a:t>
+            </a:r>
+          </a:p>
+          <a:p>
+            <a:r>
+              <a:rPr lang="en-US" sz="900" dirty="0">
+                <a:solidFill>
+                  <a:srgbClr val="000000"/>
+                </a:solidFill>
+                <a:latin typeface="Consolas" panose="020B0609020204030204" pitchFamily="49" charset="0"/>
+              </a:rPr>
+              <a:t>    </a:t>
+            </a:r>
+            <a:r>
+              <a:rPr lang="en-US" sz="900" b="1" dirty="0">
+                <a:solidFill>
+                  <a:srgbClr val="7F0055"/>
+                </a:solidFill>
+                <a:latin typeface="Consolas" panose="020B0609020204030204" pitchFamily="49" charset="0"/>
+              </a:rPr>
+              <a:t>bool</a:t>
+            </a:r>
+            <a:r>
+              <a:rPr lang="en-US" sz="900" b="1" dirty="0">
+                <a:solidFill>
+                  <a:srgbClr val="000000"/>
+                </a:solidFill>
+                <a:latin typeface="Consolas" panose="020B0609020204030204" pitchFamily="49" charset="0"/>
+              </a:rPr>
+              <a:t> </a:t>
+            </a:r>
+            <a:r>
+              <a:rPr lang="en-US" sz="900" b="1" dirty="0" err="1">
+                <a:solidFill>
+                  <a:srgbClr val="000000"/>
+                </a:solidFill>
+                <a:latin typeface="Consolas" panose="020B0609020204030204" pitchFamily="49" charset="0"/>
+              </a:rPr>
+              <a:t>rateZeroNode</a:t>
+            </a:r>
+            <a:r>
+              <a:rPr lang="en-US" sz="900" b="1" dirty="0">
+                <a:solidFill>
+                  <a:srgbClr val="000000"/>
+                </a:solidFill>
+                <a:latin typeface="Consolas" panose="020B0609020204030204" pitchFamily="49" charset="0"/>
+              </a:rPr>
+              <a:t> = </a:t>
+            </a:r>
+            <a:r>
+              <a:rPr lang="en-US" sz="900" b="1" dirty="0">
+                <a:solidFill>
+                  <a:srgbClr val="7F0055"/>
+                </a:solidFill>
+                <a:latin typeface="Consolas" panose="020B0609020204030204" pitchFamily="49" charset="0"/>
+              </a:rPr>
+              <a:t>true</a:t>
+            </a:r>
+            <a:r>
+              <a:rPr lang="en-US" sz="900" b="1" dirty="0">
+                <a:solidFill>
+                  <a:srgbClr val="000000"/>
+                </a:solidFill>
+                <a:latin typeface="Consolas" panose="020B0609020204030204" pitchFamily="49" charset="0"/>
+              </a:rPr>
+              <a:t>;</a:t>
+            </a:r>
+          </a:p>
+          <a:p>
+            <a:r>
+              <a:rPr lang="en-US" sz="900" dirty="0">
+                <a:solidFill>
+                  <a:srgbClr val="000000"/>
+                </a:solidFill>
+                <a:latin typeface="Consolas" panose="020B0609020204030204" pitchFamily="49" charset="0"/>
+              </a:rPr>
+              <a:t>    </a:t>
+            </a:r>
+            <a:r>
+              <a:rPr lang="en-US" sz="900" b="1" dirty="0">
+                <a:solidFill>
+                  <a:srgbClr val="7F0055"/>
+                </a:solidFill>
+                <a:latin typeface="Consolas" panose="020B0609020204030204" pitchFamily="49" charset="0"/>
+              </a:rPr>
+              <a:t>for</a:t>
+            </a:r>
+            <a:r>
+              <a:rPr lang="en-US" sz="900" b="1" dirty="0">
+                <a:solidFill>
+                  <a:srgbClr val="000000"/>
+                </a:solidFill>
+                <a:latin typeface="Consolas" panose="020B0609020204030204" pitchFamily="49" charset="0"/>
+              </a:rPr>
+              <a:t>(</a:t>
+            </a:r>
+            <a:r>
+              <a:rPr lang="en-US" sz="900" b="1" dirty="0">
+                <a:solidFill>
+                  <a:srgbClr val="7F0055"/>
+                </a:solidFill>
+                <a:latin typeface="Consolas" panose="020B0609020204030204" pitchFamily="49" charset="0"/>
+              </a:rPr>
+              <a:t>auto</a:t>
+            </a:r>
+            <a:r>
+              <a:rPr lang="en-US" sz="900" b="1" dirty="0">
+                <a:solidFill>
+                  <a:srgbClr val="000000"/>
+                </a:solidFill>
+                <a:latin typeface="Consolas" panose="020B0609020204030204" pitchFamily="49" charset="0"/>
+              </a:rPr>
+              <a:t> </a:t>
+            </a:r>
+            <a:r>
+              <a:rPr lang="en-US" sz="900" b="1" dirty="0" err="1">
+                <a:solidFill>
+                  <a:srgbClr val="000000"/>
+                </a:solidFill>
+                <a:latin typeface="Consolas" panose="020B0609020204030204" pitchFamily="49" charset="0"/>
+              </a:rPr>
+              <a:t>i</a:t>
+            </a:r>
+            <a:r>
+              <a:rPr lang="en-US" sz="900" b="1" dirty="0">
+                <a:solidFill>
+                  <a:srgbClr val="000000"/>
+                </a:solidFill>
+                <a:latin typeface="Consolas" panose="020B0609020204030204" pitchFamily="49" charset="0"/>
+              </a:rPr>
+              <a:t> = 0; </a:t>
+            </a:r>
+            <a:r>
+              <a:rPr lang="en-US" sz="900" b="1" dirty="0" err="1">
+                <a:solidFill>
+                  <a:srgbClr val="000000"/>
+                </a:solidFill>
+                <a:latin typeface="Consolas" panose="020B0609020204030204" pitchFamily="49" charset="0"/>
+              </a:rPr>
+              <a:t>i</a:t>
+            </a:r>
+            <a:r>
+              <a:rPr lang="en-US" sz="900" b="1" dirty="0">
+                <a:solidFill>
+                  <a:srgbClr val="000000"/>
+                </a:solidFill>
+                <a:latin typeface="Consolas" panose="020B0609020204030204" pitchFamily="49" charset="0"/>
+              </a:rPr>
+              <a:t> &lt; 256;i++) </a:t>
+            </a:r>
+            <a:r>
+              <a:rPr lang="en-US" sz="900" dirty="0">
+                <a:solidFill>
+                  <a:srgbClr val="000000"/>
+                </a:solidFill>
+                <a:latin typeface="Consolas" panose="020B0609020204030204" pitchFamily="49" charset="0"/>
+              </a:rPr>
+              <a:t>{  </a:t>
+            </a:r>
+          </a:p>
+          <a:p>
+            <a:r>
+              <a:rPr lang="en-US" sz="900" dirty="0">
+                <a:solidFill>
+                  <a:srgbClr val="000000"/>
+                </a:solidFill>
+                <a:latin typeface="Consolas" panose="020B0609020204030204" pitchFamily="49" charset="0"/>
+              </a:rPr>
+              <a:t>        </a:t>
+            </a:r>
+            <a:r>
+              <a:rPr lang="en-US" sz="900" b="1" dirty="0">
+                <a:solidFill>
+                  <a:srgbClr val="7F0055"/>
+                </a:solidFill>
+                <a:latin typeface="Consolas" panose="020B0609020204030204" pitchFamily="49" charset="0"/>
+              </a:rPr>
+              <a:t>if</a:t>
+            </a:r>
+            <a:r>
+              <a:rPr lang="en-US" sz="900" b="1" dirty="0">
+                <a:solidFill>
+                  <a:srgbClr val="000000"/>
+                </a:solidFill>
+                <a:latin typeface="Consolas" panose="020B0609020204030204" pitchFamily="49" charset="0"/>
+              </a:rPr>
+              <a:t>(</a:t>
+            </a:r>
+            <a:r>
+              <a:rPr lang="en-US" sz="900" b="1" dirty="0" err="1">
+                <a:solidFill>
+                  <a:srgbClr val="000000"/>
+                </a:solidFill>
+                <a:latin typeface="Consolas" panose="020B0609020204030204" pitchFamily="49" charset="0"/>
+              </a:rPr>
+              <a:t>frozenPattern</a:t>
+            </a:r>
+            <a:r>
+              <a:rPr lang="en-US" sz="900" b="1" dirty="0">
+                <a:solidFill>
+                  <a:srgbClr val="000000"/>
+                </a:solidFill>
+                <a:latin typeface="Consolas" panose="020B0609020204030204" pitchFamily="49" charset="0"/>
+              </a:rPr>
+              <a:t>[</a:t>
+            </a:r>
+            <a:r>
+              <a:rPr lang="en-US" sz="900" b="1" dirty="0" err="1">
+                <a:solidFill>
+                  <a:srgbClr val="000000"/>
+                </a:solidFill>
+                <a:latin typeface="Consolas" panose="020B0609020204030204" pitchFamily="49" charset="0"/>
+              </a:rPr>
+              <a:t>i</a:t>
+            </a:r>
+            <a:r>
+              <a:rPr lang="en-US" sz="900" b="1" dirty="0">
+                <a:solidFill>
+                  <a:srgbClr val="000000"/>
+                </a:solidFill>
+                <a:latin typeface="Consolas" panose="020B0609020204030204" pitchFamily="49" charset="0"/>
+              </a:rPr>
+              <a:t>] != 1) {   </a:t>
+            </a:r>
+          </a:p>
+          <a:p>
+            <a:r>
+              <a:rPr lang="en-US" sz="900" dirty="0">
+                <a:solidFill>
+                  <a:srgbClr val="000000"/>
+                </a:solidFill>
+                <a:latin typeface="Consolas" panose="020B0609020204030204" pitchFamily="49" charset="0"/>
+              </a:rPr>
+              <a:t>            </a:t>
+            </a:r>
+            <a:r>
+              <a:rPr lang="en-US" sz="900" dirty="0" err="1">
+                <a:solidFill>
+                  <a:srgbClr val="000000"/>
+                </a:solidFill>
+                <a:latin typeface="Consolas" panose="020B0609020204030204" pitchFamily="49" charset="0"/>
+              </a:rPr>
+              <a:t>rateZeroNode</a:t>
+            </a:r>
+            <a:r>
+              <a:rPr lang="en-US" sz="900" dirty="0">
+                <a:solidFill>
+                  <a:srgbClr val="000000"/>
+                </a:solidFill>
+                <a:latin typeface="Consolas" panose="020B0609020204030204" pitchFamily="49" charset="0"/>
+              </a:rPr>
+              <a:t> = </a:t>
+            </a:r>
+            <a:r>
+              <a:rPr lang="en-US" sz="900" b="1" dirty="0">
+                <a:solidFill>
+                  <a:srgbClr val="7F0055"/>
+                </a:solidFill>
+                <a:latin typeface="Consolas" panose="020B0609020204030204" pitchFamily="49" charset="0"/>
+              </a:rPr>
+              <a:t>false</a:t>
+            </a:r>
+            <a:r>
+              <a:rPr lang="en-US" sz="900" b="1" dirty="0">
+                <a:solidFill>
+                  <a:srgbClr val="000000"/>
+                </a:solidFill>
+                <a:latin typeface="Consolas" panose="020B0609020204030204" pitchFamily="49" charset="0"/>
+              </a:rPr>
+              <a:t>;</a:t>
+            </a:r>
+          </a:p>
+          <a:p>
+            <a:r>
+              <a:rPr lang="en-US" sz="900" dirty="0">
+                <a:solidFill>
+                  <a:srgbClr val="000000"/>
+                </a:solidFill>
+                <a:latin typeface="Consolas" panose="020B0609020204030204" pitchFamily="49" charset="0"/>
+              </a:rPr>
+              <a:t>            </a:t>
+            </a:r>
+            <a:r>
+              <a:rPr lang="en-US" sz="900" b="1" dirty="0">
+                <a:solidFill>
+                  <a:srgbClr val="7F0055"/>
+                </a:solidFill>
+                <a:latin typeface="Consolas" panose="020B0609020204030204" pitchFamily="49" charset="0"/>
+              </a:rPr>
+              <a:t>break</a:t>
+            </a:r>
+            <a:r>
+              <a:rPr lang="en-US" sz="900" b="1" dirty="0">
+                <a:solidFill>
+                  <a:srgbClr val="000000"/>
+                </a:solidFill>
+                <a:latin typeface="Consolas" panose="020B0609020204030204" pitchFamily="49" charset="0"/>
+              </a:rPr>
+              <a:t>;</a:t>
+            </a:r>
+          </a:p>
+          <a:p>
+            <a:r>
+              <a:rPr lang="en-US" sz="900" dirty="0">
+                <a:solidFill>
+                  <a:srgbClr val="000000"/>
+                </a:solidFill>
+                <a:latin typeface="Consolas" panose="020B0609020204030204" pitchFamily="49" charset="0"/>
+              </a:rPr>
+              <a:t>        }</a:t>
+            </a:r>
+          </a:p>
+          <a:p>
+            <a:r>
+              <a:rPr lang="en-US" sz="900" dirty="0">
+                <a:solidFill>
+                  <a:srgbClr val="000000"/>
+                </a:solidFill>
+                <a:latin typeface="Consolas" panose="020B0609020204030204" pitchFamily="49" charset="0"/>
+              </a:rPr>
+              <a:t>    }  </a:t>
+            </a:r>
+          </a:p>
+          <a:p>
+            <a:r>
+              <a:rPr lang="en-US" sz="900" dirty="0">
+                <a:solidFill>
+                  <a:srgbClr val="000000"/>
+                </a:solidFill>
+                <a:latin typeface="Consolas" panose="020B0609020204030204" pitchFamily="49" charset="0"/>
+              </a:rPr>
+              <a:t>    </a:t>
+            </a:r>
+            <a:r>
+              <a:rPr lang="en-US" sz="900" b="1" dirty="0">
+                <a:solidFill>
+                  <a:srgbClr val="7F0055"/>
+                </a:solidFill>
+                <a:latin typeface="Consolas" panose="020B0609020204030204" pitchFamily="49" charset="0"/>
+              </a:rPr>
+              <a:t>return</a:t>
+            </a:r>
+            <a:r>
+              <a:rPr lang="en-US" sz="900" b="1" dirty="0">
+                <a:solidFill>
+                  <a:srgbClr val="000000"/>
+                </a:solidFill>
+                <a:latin typeface="Consolas" panose="020B0609020204030204" pitchFamily="49" charset="0"/>
+              </a:rPr>
+              <a:t> </a:t>
+            </a:r>
+            <a:r>
+              <a:rPr lang="en-US" sz="900" b="1" dirty="0" err="1">
+                <a:solidFill>
+                  <a:srgbClr val="000000"/>
+                </a:solidFill>
+                <a:latin typeface="Consolas" panose="020B0609020204030204" pitchFamily="49" charset="0"/>
+              </a:rPr>
+              <a:t>rateZeroNode</a:t>
+            </a:r>
+            <a:r>
+              <a:rPr lang="en-US" sz="900" b="1" dirty="0">
+                <a:solidFill>
+                  <a:srgbClr val="000000"/>
+                </a:solidFill>
+                <a:latin typeface="Consolas" panose="020B0609020204030204" pitchFamily="49" charset="0"/>
+              </a:rPr>
+              <a:t>; </a:t>
+            </a:r>
+          </a:p>
+          <a:p>
+            <a:r>
+              <a:rPr lang="en-US" sz="900" dirty="0">
+                <a:solidFill>
+                  <a:srgbClr val="000000"/>
+                </a:solidFill>
+                <a:latin typeface="Consolas" panose="020B0609020204030204" pitchFamily="49" charset="0"/>
+              </a:rPr>
+              <a:t>}</a:t>
+            </a:r>
+            <a:endParaRPr lang="en-US" sz="900" dirty="0"/>
+          </a:p>
+        </p:txBody>
+      </p:sp>
+      <p:sp>
+        <p:nvSpPr>
+          <p:cNvPr id="3" name="Slide Number Placeholder 2"/>
+          <p:cNvSpPr>
+            <a:spLocks noGrp="1"/>
+          </p:cNvSpPr>
+          <p:nvPr>
+            <p:ph type="sldNum" sz="quarter" idx="11"/>
+          </p:nvPr>
+        </p:nvSpPr>
+        <p:spPr/>
+        <p:txBody>
+          <a:bodyPr/>
+          <a:lstStyle/>
+          <a:p>
+            <a:fld id="{CE58CB1E-F828-4F11-99E0-327109AF9DA4}" type="slidenum">
+              <a:rPr lang="de-DE" smtClean="0"/>
+              <a:pPr/>
+              <a:t>21</a:t>
+            </a:fld>
+            <a:endParaRPr lang="de-DE" dirty="0"/>
+          </a:p>
+        </p:txBody>
+      </p:sp>
+      <p:sp>
+        <p:nvSpPr>
+          <p:cNvPr id="4" name="Title 3"/>
+          <p:cNvSpPr>
+            <a:spLocks noGrp="1"/>
+          </p:cNvSpPr>
+          <p:nvPr>
+            <p:ph type="title"/>
+          </p:nvPr>
+        </p:nvSpPr>
+        <p:spPr>
+          <a:xfrm>
+            <a:off x="318009" y="706009"/>
+            <a:ext cx="8508999" cy="410369"/>
+          </a:xfrm>
+        </p:spPr>
+        <p:txBody>
+          <a:bodyPr/>
+          <a:lstStyle/>
+          <a:p>
+            <a:r>
+              <a:rPr lang="en-US" dirty="0">
+                <a:solidFill>
+                  <a:schemeClr val="bg2"/>
+                </a:solidFill>
+              </a:rPr>
+              <a:t>Packing frozen pattern</a:t>
+            </a:r>
+          </a:p>
+        </p:txBody>
+      </p:sp>
+      <p:sp>
+        <p:nvSpPr>
+          <p:cNvPr id="187" name="TextBox 186"/>
+          <p:cNvSpPr txBox="1"/>
+          <p:nvPr/>
+        </p:nvSpPr>
+        <p:spPr>
+          <a:xfrm>
+            <a:off x="1007258" y="3897824"/>
+            <a:ext cx="1014632" cy="257250"/>
+          </a:xfrm>
+          <a:prstGeom prst="rect">
+            <a:avLst/>
+          </a:prstGeom>
+          <a:noFill/>
+        </p:spPr>
+        <p:txBody>
+          <a:bodyPr wrap="square" lIns="0" tIns="0" rIns="0" bIns="0" rtlCol="0">
+            <a:spAutoFit/>
+          </a:bodyPr>
+          <a:lstStyle/>
+          <a:p>
+            <a:pPr>
+              <a:lnSpc>
+                <a:spcPct val="114000"/>
+              </a:lnSpc>
+            </a:pPr>
+            <a:r>
+              <a:rPr lang="en-US" sz="1600" dirty="0">
+                <a:latin typeface="+mn-lt"/>
+              </a:rPr>
+              <a:t>Naive way</a:t>
+            </a:r>
+          </a:p>
+        </p:txBody>
+      </p:sp>
+      <p:sp>
+        <p:nvSpPr>
+          <p:cNvPr id="196" name="TextBox 195"/>
+          <p:cNvSpPr txBox="1"/>
+          <p:nvPr/>
+        </p:nvSpPr>
+        <p:spPr>
+          <a:xfrm>
+            <a:off x="4715973" y="3874356"/>
+            <a:ext cx="2126529" cy="280718"/>
+          </a:xfrm>
+          <a:prstGeom prst="rect">
+            <a:avLst/>
+          </a:prstGeom>
+          <a:noFill/>
+        </p:spPr>
+        <p:txBody>
+          <a:bodyPr wrap="square" lIns="0" tIns="0" rIns="0" bIns="0" rtlCol="0">
+            <a:spAutoFit/>
+          </a:bodyPr>
+          <a:lstStyle/>
+          <a:p>
+            <a:pPr>
+              <a:lnSpc>
+                <a:spcPct val="114000"/>
+              </a:lnSpc>
+            </a:pPr>
+            <a:r>
+              <a:rPr lang="en-US" sz="1600" dirty="0">
+                <a:latin typeface="+mn-lt"/>
+              </a:rPr>
+              <a:t>Efficient SIMD way</a:t>
+            </a:r>
+          </a:p>
+        </p:txBody>
+      </p:sp>
+      <p:sp>
+        <p:nvSpPr>
+          <p:cNvPr id="201" name="Rectangle 200"/>
+          <p:cNvSpPr/>
+          <p:nvPr/>
+        </p:nvSpPr>
+        <p:spPr>
+          <a:xfrm>
+            <a:off x="4255007" y="4164351"/>
+            <a:ext cx="4572000" cy="1892826"/>
+          </a:xfrm>
+          <a:prstGeom prst="rect">
+            <a:avLst/>
+          </a:prstGeom>
+        </p:spPr>
+        <p:txBody>
+          <a:bodyPr>
+            <a:spAutoFit/>
+          </a:bodyPr>
+          <a:lstStyle/>
+          <a:p>
+            <a:r>
+              <a:rPr lang="en-US" sz="900" b="1" dirty="0">
+                <a:solidFill>
+                  <a:srgbClr val="7F0055"/>
+                </a:solidFill>
+                <a:latin typeface="Consolas" panose="020B0609020204030204" pitchFamily="49" charset="0"/>
+              </a:rPr>
+              <a:t>template</a:t>
+            </a:r>
+            <a:r>
+              <a:rPr lang="en-US" sz="900" b="1" dirty="0">
+                <a:solidFill>
+                  <a:srgbClr val="000000"/>
+                </a:solidFill>
+                <a:latin typeface="Consolas" panose="020B0609020204030204" pitchFamily="49" charset="0"/>
+              </a:rPr>
+              <a:t>&lt;&gt;</a:t>
+            </a:r>
+          </a:p>
+          <a:p>
+            <a:r>
+              <a:rPr lang="en-US" sz="900" b="1" dirty="0">
+                <a:solidFill>
+                  <a:srgbClr val="7F0055"/>
+                </a:solidFill>
+                <a:latin typeface="Consolas" panose="020B0609020204030204" pitchFamily="49" charset="0"/>
+              </a:rPr>
+              <a:t>inline</a:t>
+            </a:r>
+            <a:r>
+              <a:rPr lang="en-US" sz="900" b="1" dirty="0">
+                <a:solidFill>
+                  <a:srgbClr val="000000"/>
+                </a:solidFill>
+                <a:latin typeface="Consolas" panose="020B0609020204030204" pitchFamily="49" charset="0"/>
+              </a:rPr>
+              <a:t> </a:t>
+            </a:r>
+            <a:r>
+              <a:rPr lang="en-US" sz="900" b="1" dirty="0">
+                <a:solidFill>
+                  <a:srgbClr val="7F0055"/>
+                </a:solidFill>
+                <a:latin typeface="Consolas" panose="020B0609020204030204" pitchFamily="49" charset="0"/>
+              </a:rPr>
+              <a:t>bool</a:t>
+            </a:r>
+            <a:r>
+              <a:rPr lang="en-US" sz="900" b="1" dirty="0">
+                <a:solidFill>
+                  <a:srgbClr val="000000"/>
+                </a:solidFill>
+                <a:latin typeface="Consolas" panose="020B0609020204030204" pitchFamily="49" charset="0"/>
+              </a:rPr>
+              <a:t> </a:t>
+            </a:r>
+            <a:r>
+              <a:rPr lang="de-DE" sz="900" b="1" dirty="0" err="1">
+                <a:solidFill>
+                  <a:srgbClr val="000000"/>
+                </a:solidFill>
+                <a:latin typeface="Consolas" panose="020B0609020204030204" pitchFamily="49" charset="0"/>
+              </a:rPr>
+              <a:t>isRateZeroNode</a:t>
+            </a:r>
+            <a:r>
+              <a:rPr lang="de-DE" sz="900" b="1" dirty="0">
+                <a:solidFill>
+                  <a:srgbClr val="000000"/>
+                </a:solidFill>
+                <a:latin typeface="Consolas" panose="020B0609020204030204" pitchFamily="49" charset="0"/>
+              </a:rPr>
+              <a:t>(</a:t>
+            </a:r>
+            <a:r>
+              <a:rPr lang="en-US" sz="900" b="1" dirty="0">
+                <a:solidFill>
+                  <a:srgbClr val="005032"/>
+                </a:solidFill>
+                <a:latin typeface="Consolas" panose="020B0609020204030204" pitchFamily="49" charset="0"/>
+              </a:rPr>
+              <a:t>uint64_t</a:t>
+            </a:r>
+            <a:r>
+              <a:rPr lang="en-US" sz="900" b="1" dirty="0">
+                <a:solidFill>
+                  <a:srgbClr val="000000"/>
+                </a:solidFill>
+                <a:latin typeface="Consolas" panose="020B0609020204030204" pitchFamily="49" charset="0"/>
+              </a:rPr>
+              <a:t> s[]) {</a:t>
+            </a:r>
+          </a:p>
+          <a:p>
+            <a:endParaRPr lang="en-US" sz="900" dirty="0">
+              <a:latin typeface="Consolas" panose="020B0609020204030204" pitchFamily="49" charset="0"/>
+            </a:endParaRPr>
+          </a:p>
+          <a:p>
+            <a:r>
+              <a:rPr lang="en-US" sz="900" dirty="0">
+                <a:solidFill>
+                  <a:srgbClr val="000000"/>
+                </a:solidFill>
+                <a:latin typeface="Consolas" panose="020B0609020204030204" pitchFamily="49" charset="0"/>
+              </a:rPr>
+              <a:t>    </a:t>
+            </a:r>
+            <a:r>
+              <a:rPr lang="en-US" sz="900" dirty="0">
+                <a:solidFill>
+                  <a:srgbClr val="005032"/>
+                </a:solidFill>
+                <a:latin typeface="Consolas" panose="020B0609020204030204" pitchFamily="49" charset="0"/>
+              </a:rPr>
+              <a:t>__m256i</a:t>
+            </a:r>
+            <a:r>
+              <a:rPr lang="en-US" sz="900" dirty="0">
+                <a:solidFill>
+                  <a:srgbClr val="000000"/>
+                </a:solidFill>
+                <a:latin typeface="Consolas" panose="020B0609020204030204" pitchFamily="49" charset="0"/>
+              </a:rPr>
+              <a:t> temp1 = _mm256_loadu_si256 ((</a:t>
+            </a:r>
+            <a:r>
+              <a:rPr lang="en-US" sz="900" dirty="0">
+                <a:solidFill>
+                  <a:srgbClr val="005032"/>
+                </a:solidFill>
+                <a:latin typeface="Consolas" panose="020B0609020204030204" pitchFamily="49" charset="0"/>
+              </a:rPr>
+              <a:t>__m256i</a:t>
+            </a:r>
+            <a:r>
+              <a:rPr lang="en-US" sz="900" dirty="0">
+                <a:solidFill>
+                  <a:srgbClr val="000000"/>
+                </a:solidFill>
+                <a:latin typeface="Consolas" panose="020B0609020204030204" pitchFamily="49" charset="0"/>
+              </a:rPr>
+              <a:t>*)s);</a:t>
+            </a:r>
+          </a:p>
+          <a:p>
+            <a:r>
+              <a:rPr lang="en-US" sz="900" dirty="0">
+                <a:solidFill>
+                  <a:srgbClr val="000000"/>
+                </a:solidFill>
+                <a:latin typeface="Consolas" panose="020B0609020204030204" pitchFamily="49" charset="0"/>
+              </a:rPr>
+              <a:t>    </a:t>
+            </a:r>
+            <a:r>
+              <a:rPr lang="en-US" sz="900" dirty="0">
+                <a:solidFill>
+                  <a:srgbClr val="005032"/>
+                </a:solidFill>
+                <a:latin typeface="Consolas" panose="020B0609020204030204" pitchFamily="49" charset="0"/>
+              </a:rPr>
+              <a:t>__m256i</a:t>
+            </a:r>
+            <a:r>
+              <a:rPr lang="en-US" sz="900" dirty="0">
+                <a:solidFill>
+                  <a:srgbClr val="000000"/>
+                </a:solidFill>
+                <a:latin typeface="Consolas" panose="020B0609020204030204" pitchFamily="49" charset="0"/>
+              </a:rPr>
+              <a:t> temp2;</a:t>
+            </a:r>
+            <a:endParaRPr lang="en-US" sz="900" dirty="0">
+              <a:latin typeface="Consolas" panose="020B0609020204030204" pitchFamily="49" charset="0"/>
+            </a:endParaRPr>
+          </a:p>
+          <a:p>
+            <a:r>
+              <a:rPr lang="en-US" sz="900" dirty="0">
+                <a:solidFill>
+                  <a:srgbClr val="000000"/>
+                </a:solidFill>
+                <a:latin typeface="Consolas" panose="020B0609020204030204" pitchFamily="49" charset="0"/>
+              </a:rPr>
+              <a:t>    temp2 = _mm256_set1_epi8 ((</a:t>
+            </a:r>
+            <a:r>
+              <a:rPr lang="en-US" sz="900" b="1" dirty="0">
+                <a:solidFill>
+                  <a:srgbClr val="7F0055"/>
+                </a:solidFill>
+                <a:latin typeface="Consolas" panose="020B0609020204030204" pitchFamily="49" charset="0"/>
+              </a:rPr>
+              <a:t>char</a:t>
+            </a:r>
+            <a:r>
+              <a:rPr lang="en-US" sz="900" b="1" dirty="0">
+                <a:solidFill>
+                  <a:srgbClr val="000000"/>
+                </a:solidFill>
+                <a:latin typeface="Consolas" panose="020B0609020204030204" pitchFamily="49" charset="0"/>
+              </a:rPr>
+              <a:t>)0xFF);</a:t>
+            </a:r>
+          </a:p>
+          <a:p>
+            <a:endParaRPr lang="en-US" sz="900" b="1" dirty="0">
+              <a:solidFill>
+                <a:srgbClr val="000000"/>
+              </a:solidFill>
+              <a:latin typeface="Consolas" panose="020B0609020204030204" pitchFamily="49" charset="0"/>
+            </a:endParaRPr>
+          </a:p>
+          <a:p>
+            <a:r>
+              <a:rPr lang="en-US" sz="900" dirty="0">
+                <a:solidFill>
+                  <a:srgbClr val="005032"/>
+                </a:solidFill>
+                <a:latin typeface="Consolas" panose="020B0609020204030204" pitchFamily="49" charset="0"/>
+              </a:rPr>
+              <a:t>    __m256i</a:t>
+            </a:r>
+            <a:r>
+              <a:rPr lang="en-US" sz="900" dirty="0">
+                <a:solidFill>
+                  <a:srgbClr val="000000"/>
+                </a:solidFill>
+                <a:latin typeface="Consolas" panose="020B0609020204030204" pitchFamily="49" charset="0"/>
+              </a:rPr>
+              <a:t> </a:t>
+            </a:r>
+            <a:r>
+              <a:rPr lang="en-US" sz="900" dirty="0" err="1">
+                <a:solidFill>
+                  <a:srgbClr val="000000"/>
+                </a:solidFill>
+                <a:latin typeface="Consolas" panose="020B0609020204030204" pitchFamily="49" charset="0"/>
+              </a:rPr>
+              <a:t>pcmp</a:t>
+            </a:r>
+            <a:r>
+              <a:rPr lang="en-US" sz="900" dirty="0">
+                <a:solidFill>
+                  <a:srgbClr val="000000"/>
+                </a:solidFill>
+                <a:latin typeface="Consolas" panose="020B0609020204030204" pitchFamily="49" charset="0"/>
+              </a:rPr>
+              <a:t> = _mm256_cmpeq_epi64 (temp1, temp2);</a:t>
+            </a:r>
+          </a:p>
+          <a:p>
+            <a:endParaRPr lang="en-US" sz="900" dirty="0">
+              <a:latin typeface="Consolas" panose="020B0609020204030204" pitchFamily="49" charset="0"/>
+            </a:endParaRPr>
+          </a:p>
+          <a:p>
+            <a:r>
+              <a:rPr lang="en-US" sz="900" dirty="0">
+                <a:solidFill>
+                  <a:srgbClr val="000000"/>
+                </a:solidFill>
+                <a:latin typeface="Consolas" panose="020B0609020204030204" pitchFamily="49" charset="0"/>
+              </a:rPr>
+              <a:t>    </a:t>
+            </a:r>
+            <a:r>
+              <a:rPr lang="en-US" sz="900" b="1" dirty="0">
+                <a:solidFill>
+                  <a:srgbClr val="7F0055"/>
+                </a:solidFill>
+                <a:latin typeface="Consolas" panose="020B0609020204030204" pitchFamily="49" charset="0"/>
+              </a:rPr>
+              <a:t>unsigned</a:t>
+            </a:r>
+            <a:r>
+              <a:rPr lang="en-US" sz="900" b="1" dirty="0">
+                <a:solidFill>
+                  <a:srgbClr val="000000"/>
+                </a:solidFill>
+                <a:latin typeface="Consolas" panose="020B0609020204030204" pitchFamily="49" charset="0"/>
+              </a:rPr>
+              <a:t> bitmask = _mm256_movemask_epi8(</a:t>
+            </a:r>
+            <a:r>
+              <a:rPr lang="en-US" sz="900" b="1" dirty="0" err="1">
+                <a:solidFill>
+                  <a:srgbClr val="000000"/>
+                </a:solidFill>
+                <a:latin typeface="Consolas" panose="020B0609020204030204" pitchFamily="49" charset="0"/>
+              </a:rPr>
+              <a:t>pcmp</a:t>
+            </a:r>
+            <a:r>
+              <a:rPr lang="en-US" sz="900" b="1" dirty="0">
+                <a:solidFill>
+                  <a:srgbClr val="000000"/>
+                </a:solidFill>
+                <a:latin typeface="Consolas" panose="020B0609020204030204" pitchFamily="49" charset="0"/>
+              </a:rPr>
+              <a:t>);</a:t>
+            </a:r>
+          </a:p>
+          <a:p>
+            <a:endParaRPr lang="en-US" sz="900" dirty="0">
+              <a:latin typeface="Consolas" panose="020B0609020204030204" pitchFamily="49" charset="0"/>
+            </a:endParaRPr>
+          </a:p>
+          <a:p>
+            <a:r>
+              <a:rPr lang="en-US" sz="900" dirty="0">
+                <a:solidFill>
+                  <a:srgbClr val="000000"/>
+                </a:solidFill>
+                <a:latin typeface="Consolas" panose="020B0609020204030204" pitchFamily="49" charset="0"/>
+              </a:rPr>
+              <a:t>    </a:t>
+            </a:r>
+            <a:r>
+              <a:rPr lang="en-US" sz="900" b="1" dirty="0">
+                <a:solidFill>
+                  <a:srgbClr val="7F0055"/>
+                </a:solidFill>
+                <a:latin typeface="Consolas" panose="020B0609020204030204" pitchFamily="49" charset="0"/>
+              </a:rPr>
+              <a:t>return</a:t>
+            </a:r>
+            <a:r>
+              <a:rPr lang="en-US" sz="900" b="1" dirty="0">
+                <a:solidFill>
+                  <a:srgbClr val="000000"/>
+                </a:solidFill>
+                <a:latin typeface="Consolas" panose="020B0609020204030204" pitchFamily="49" charset="0"/>
+              </a:rPr>
+              <a:t> (bitmask == 0xffffffffU);</a:t>
+            </a:r>
+          </a:p>
+          <a:p>
+            <a:r>
+              <a:rPr lang="en-US" sz="900" dirty="0">
+                <a:solidFill>
+                  <a:srgbClr val="000000"/>
+                </a:solidFill>
+                <a:latin typeface="Consolas" panose="020B0609020204030204" pitchFamily="49" charset="0"/>
+              </a:rPr>
+              <a:t>}</a:t>
+            </a:r>
+            <a:endParaRPr lang="en-US" sz="900" dirty="0"/>
+          </a:p>
+        </p:txBody>
+      </p:sp>
+      <p:sp>
+        <p:nvSpPr>
+          <p:cNvPr id="639" name="RS_Classification_Standard"/>
+          <p:cNvSpPr txBox="1"/>
+          <p:nvPr/>
+        </p:nvSpPr>
+        <p:spPr>
+          <a:xfrm>
+            <a:off x="8990047" y="6187613"/>
+            <a:ext cx="153953" cy="251287"/>
+          </a:xfrm>
+          <a:prstGeom prst="rect">
+            <a:avLst/>
+          </a:prstGeom>
+          <a:solidFill>
+            <a:srgbClr val="FFFFFF">
+              <a:alpha val="0"/>
+            </a:srgbClr>
+          </a:solidFill>
+        </p:spPr>
+        <p:txBody>
+          <a:bodyPr vert="horz" wrap="none" lIns="76200" tIns="36830" rIns="76200" bIns="36830" rtlCol="0" anchor="ctr">
+            <a:spAutoFit/>
+          </a:bodyPr>
+          <a:lstStyle/>
+          <a:p>
+            <a:endParaRPr lang="en-US" sz="1100" b="1" kern="900" spc="100" dirty="0" err="1">
+              <a:solidFill>
+                <a:srgbClr val="000000"/>
+              </a:solidFill>
+              <a:latin typeface="+mn-lt"/>
+            </a:endParaRPr>
+          </a:p>
+        </p:txBody>
+      </p:sp>
+    </p:spTree>
+    <p:custDataLst>
+      <p:tags r:id="rId1"/>
+    </p:custDataLst>
+    <p:extLst>
+      <p:ext uri="{BB962C8B-B14F-4D97-AF65-F5344CB8AC3E}">
+        <p14:creationId xmlns:p14="http://schemas.microsoft.com/office/powerpoint/2010/main" val="3260881012"/>
+      </p:ext>
+    </p:extLst>
+  </p:cSld>
+  <p:clrMapOvr>
+    <a:masterClrMapping/>
+  </p:clrMapOvr>
+</p:sld>
+</file>
+
 <file path=ppt/slides/slide22.xml><?xml version="1.0" encoding="utf-8"?>
 <p:sld xmlns:a="http://schemas.openxmlformats.org/drawingml/2006/main" xmlns:r="http://schemas.openxmlformats.org/officeDocument/2006/relationships" xmlns:p="http://schemas.openxmlformats.org/presentationml/2006/main">
   <p:cSld>
@@ -24442,8 +24367,8 @@
           <a:chExt cx="0" cy="0"/>
         </a:xfrm>
       </p:grpSpPr>
-      <mc:AlternateContent xmlns:mc="http://schemas.openxmlformats.org/markup-compatibility/2006">
-        <mc:Choice xmlns:a14="http://schemas.microsoft.com/office/drawing/2010/main" Requires="a14">
+      <mc:AlternateContent xmlns:mc="http://schemas.openxmlformats.org/markup-compatibility/2006" xmlns:a14="http://schemas.microsoft.com/office/drawing/2010/main">
+        <mc:Choice Requires="a14">
           <p:sp>
             <p:nvSpPr>
               <p:cNvPr id="2" name="Content Placeholder 1"/>
@@ -24728,7 +24653,7 @@
             </p:txBody>
           </p:sp>
         </mc:Choice>
-        <mc:Fallback>
+        <mc:Fallback xmlns="">
           <p:sp>
             <p:nvSpPr>
               <p:cNvPr id="2" name="Content Placeholder 1"/>
@@ -33228,8 +33153,8 @@
         </p:blipFill>
         <p:spPr>
           <a:xfrm>
-            <a:off x="5589280" y="2688389"/>
-            <a:ext cx="1537488" cy="1788927"/>
+            <a:off x="5457545" y="3021401"/>
+            <a:ext cx="2122436" cy="2469537"/>
           </a:xfrm>
           <a:prstGeom prst="rect">
             <a:avLst/>
@@ -33251,7 +33176,7 @@
         </p:nvSpPr>
         <p:spPr>
           <a:xfrm>
-            <a:off x="5589280" y="2231922"/>
+            <a:off x="5858272" y="2516773"/>
             <a:ext cx="1721709" cy="369909"/>
           </a:xfrm>
           <a:prstGeom prst="rect">

</xml_diff>